<commit_message>
update fibonacci based on pascal
</commit_message>
<xml_diff>
--- a/CSE2021 - Programming 1/2022-09-25/2022-09-25.pptx
+++ b/CSE2021 - Programming 1/2022-09-25/2022-09-25.pptx
@@ -5,7 +5,7 @@
     <p:sldMasterId id="2147483706" r:id="rId1"/>
   </p:sldMasterIdLst>
   <p:notesMasterIdLst>
-    <p:notesMasterId r:id="rId25"/>
+    <p:notesMasterId r:id="rId29"/>
   </p:notesMasterIdLst>
   <p:sldIdLst>
     <p:sldId id="256" r:id="rId2"/>
@@ -31,33 +31,44 @@
     <p:sldId id="388" r:id="rId22"/>
     <p:sldId id="387" r:id="rId23"/>
     <p:sldId id="362" r:id="rId24"/>
+    <p:sldId id="389" r:id="rId25"/>
+    <p:sldId id="390" r:id="rId26"/>
+    <p:sldId id="391" r:id="rId27"/>
+    <p:sldId id="392" r:id="rId28"/>
   </p:sldIdLst>
   <p:sldSz cx="9144000" cy="5143500" type="screen16x9"/>
   <p:notesSz cx="6858000" cy="9144000"/>
   <p:embeddedFontLst>
     <p:embeddedFont>
       <p:font typeface="Algerian" panose="04020705040A02060702" pitchFamily="82" charset="0"/>
-      <p:regular r:id="rId26"/>
+      <p:regular r:id="rId30"/>
     </p:embeddedFont>
     <p:embeddedFont>
-      <p:font typeface="Inconsolata" pitchFamily="2" charset="0"/>
-      <p:regular r:id="rId27"/>
-      <p:bold r:id="rId28"/>
+      <p:font typeface="Consolas" panose="020B0609020204030204" pitchFamily="49" charset="0"/>
+      <p:regular r:id="rId31"/>
+      <p:bold r:id="rId32"/>
+      <p:italic r:id="rId33"/>
+      <p:boldItalic r:id="rId34"/>
+    </p:embeddedFont>
+    <p:embeddedFont>
+      <p:font typeface="Inconsolata" pitchFamily="1" charset="0"/>
+      <p:regular r:id="rId35"/>
+      <p:bold r:id="rId36"/>
     </p:embeddedFont>
     <p:embeddedFont>
       <p:font typeface="Open Sans" panose="020B0606030504020204" pitchFamily="34" charset="0"/>
-      <p:regular r:id="rId29"/>
-      <p:bold r:id="rId30"/>
-      <p:italic r:id="rId31"/>
-      <p:boldItalic r:id="rId32"/>
+      <p:regular r:id="rId37"/>
+      <p:bold r:id="rId38"/>
+      <p:italic r:id="rId39"/>
+      <p:boldItalic r:id="rId40"/>
     </p:embeddedFont>
     <p:embeddedFont>
       <p:font typeface="Spy Agency" panose="020B0604020202020204"/>
-      <p:regular r:id="rId33"/>
+      <p:regular r:id="rId41"/>
     </p:embeddedFont>
     <p:embeddedFont>
       <p:font typeface="Spy Agency 3D" panose="020B0604020202020204"/>
-      <p:regular r:id="rId34"/>
+      <p:regular r:id="rId42"/>
     </p:embeddedFont>
   </p:embeddedFontLst>
   <p:defaultTextStyle>
@@ -9658,7 +9669,7 @@
                     <a:p>
                       <a:pPr algn="ctr"/>
                       <a:r>
-                        <a:rPr lang="en-US"/>
+                        <a:rPr lang="en-US" dirty="0"/>
                         <a:t>0</a:t>
                       </a:r>
                     </a:p>
@@ -9694,7 +9705,7 @@
                     <a:p>
                       <a:pPr algn="ctr"/>
                       <a:r>
-                        <a:rPr lang="en-US"/>
+                        <a:rPr lang="en-US" dirty="0"/>
                         <a:t>1</a:t>
                       </a:r>
                     </a:p>
@@ -13797,6 +13808,2442 @@
     <p:extLst>
       <p:ext uri="{BB962C8B-B14F-4D97-AF65-F5344CB8AC3E}">
         <p14:creationId xmlns:p14="http://schemas.microsoft.com/office/powerpoint/2010/main" val="2312886848"/>
+      </p:ext>
+    </p:extLst>
+  </p:cSld>
+  <p:clrMapOvr>
+    <a:masterClrMapping/>
+  </p:clrMapOvr>
+</p:sld>
+</file>
+
+<file path=ppt/slides/slide24.xml><?xml version="1.0" encoding="utf-8"?>
+<p:sld xmlns:a="http://schemas.openxmlformats.org/drawingml/2006/main" xmlns:r="http://schemas.openxmlformats.org/officeDocument/2006/relationships" xmlns:p="http://schemas.openxmlformats.org/presentationml/2006/main">
+  <p:cSld>
+    <p:spTree>
+      <p:nvGrpSpPr>
+        <p:cNvPr id="1" name=""/>
+        <p:cNvGrpSpPr/>
+        <p:nvPr/>
+      </p:nvGrpSpPr>
+      <p:grpSpPr>
+        <a:xfrm>
+          <a:off x="0" y="0"/>
+          <a:ext cx="0" cy="0"/>
+          <a:chOff x="0" y="0"/>
+          <a:chExt cx="0" cy="0"/>
+        </a:xfrm>
+      </p:grpSpPr>
+      <p:sp>
+        <p:nvSpPr>
+          <p:cNvPr id="2" name="Slide Number Placeholder 1">
+            <a:extLst>
+              <a:ext uri="{FF2B5EF4-FFF2-40B4-BE49-F238E27FC236}">
+                <a16:creationId xmlns:a16="http://schemas.microsoft.com/office/drawing/2014/main" id="{F0E9E79F-BAA5-4481-B2DE-5A5D2AAAB517}"/>
+              </a:ext>
+            </a:extLst>
+          </p:cNvPr>
+          <p:cNvSpPr>
+            <a:spLocks noGrp="1"/>
+          </p:cNvSpPr>
+          <p:nvPr>
+            <p:ph type="sldNum" sz="quarter" idx="11"/>
+          </p:nvPr>
+        </p:nvSpPr>
+        <p:spPr/>
+        <p:txBody>
+          <a:bodyPr/>
+          <a:lstStyle/>
+          <a:p>
+            <a:fld id="{54586125-9BB9-47C9-A1C0-5B3BEBE258A1}" type="slidenum">
+              <a:rPr lang="en-US" smtClean="0"/>
+              <a:t>24</a:t>
+            </a:fld>
+            <a:endParaRPr lang="en-US"/>
+          </a:p>
+        </p:txBody>
+      </p:sp>
+      <p:cxnSp>
+        <p:nvCxnSpPr>
+          <p:cNvPr id="3" name="Google Shape;413;p66">
+            <a:extLst>
+              <a:ext uri="{FF2B5EF4-FFF2-40B4-BE49-F238E27FC236}">
+                <a16:creationId xmlns:a16="http://schemas.microsoft.com/office/drawing/2014/main" id="{888B6229-90BF-496A-9A39-6C2BF18692D6}"/>
+              </a:ext>
+            </a:extLst>
+          </p:cNvPr>
+          <p:cNvCxnSpPr>
+            <a:cxnSpLocks/>
+          </p:cNvCxnSpPr>
+          <p:nvPr/>
+        </p:nvCxnSpPr>
+        <p:spPr>
+          <a:xfrm>
+            <a:off x="7277493" y="430025"/>
+            <a:ext cx="1884582" cy="0"/>
+          </a:xfrm>
+          <a:prstGeom prst="straightConnector1">
+            <a:avLst/>
+          </a:prstGeom>
+          <a:noFill/>
+          <a:ln w="9525" cap="flat" cmpd="sng">
+            <a:solidFill>
+              <a:schemeClr val="accent2"/>
+            </a:solidFill>
+            <a:prstDash val="solid"/>
+            <a:round/>
+            <a:headEnd type="none" w="med" len="med"/>
+            <a:tailEnd type="none" w="med" len="med"/>
+          </a:ln>
+        </p:spPr>
+      </p:cxnSp>
+      <p:sp>
+        <p:nvSpPr>
+          <p:cNvPr id="12" name="Title 1">
+            <a:extLst>
+              <a:ext uri="{FF2B5EF4-FFF2-40B4-BE49-F238E27FC236}">
+                <a16:creationId xmlns:a16="http://schemas.microsoft.com/office/drawing/2014/main" id="{669B6B9A-114E-4164-9D9C-67C30657CC88}"/>
+              </a:ext>
+            </a:extLst>
+          </p:cNvPr>
+          <p:cNvSpPr txBox="1">
+            <a:spLocks/>
+          </p:cNvSpPr>
+          <p:nvPr/>
+        </p:nvSpPr>
+        <p:spPr>
+          <a:xfrm>
+            <a:off x="3482340" y="155904"/>
+            <a:ext cx="3571604" cy="538486"/>
+          </a:xfrm>
+          <a:prstGeom prst="rect">
+            <a:avLst/>
+          </a:prstGeom>
+          <a:noFill/>
+          <a:ln>
+            <a:noFill/>
+          </a:ln>
+        </p:spPr>
+        <p:txBody>
+          <a:bodyPr spcFirstLastPara="1" wrap="square" lIns="91425" tIns="91425" rIns="91425" bIns="91425" anchor="t" anchorCtr="0">
+            <a:normAutofit fontScale="92500" lnSpcReduction="10000"/>
+          </a:bodyPr>
+          <a:lstStyle>
+            <a:defPPr marR="0" lvl="0" algn="l" rtl="0">
+              <a:lnSpc>
+                <a:spcPct val="100000"/>
+              </a:lnSpc>
+              <a:spcBef>
+                <a:spcPts val="0"/>
+              </a:spcBef>
+              <a:spcAft>
+                <a:spcPts val="0"/>
+              </a:spcAft>
+            </a:defPPr>
+            <a:lvl1pPr marR="0" lvl="0" algn="l" rtl="0">
+              <a:lnSpc>
+                <a:spcPct val="80000"/>
+              </a:lnSpc>
+              <a:spcBef>
+                <a:spcPts val="0"/>
+              </a:spcBef>
+              <a:spcAft>
+                <a:spcPts val="0"/>
+              </a:spcAft>
+              <a:buClr>
+                <a:schemeClr val="dk1"/>
+              </a:buClr>
+              <a:buSzPts val="3600"/>
+              <a:buFont typeface="Inconsolata"/>
+              <a:buNone/>
+              <a:defRPr sz="4000" b="1" i="0" u="none" strike="noStrike" cap="none">
+                <a:solidFill>
+                  <a:schemeClr val="dk1"/>
+                </a:solidFill>
+                <a:latin typeface="Inconsolata"/>
+                <a:ea typeface="Inconsolata"/>
+                <a:cs typeface="Inconsolata"/>
+                <a:sym typeface="Inconsolata"/>
+              </a:defRPr>
+            </a:lvl1pPr>
+            <a:lvl2pPr marR="0" lvl="1" algn="ctr" rtl="0">
+              <a:lnSpc>
+                <a:spcPct val="100000"/>
+              </a:lnSpc>
+              <a:spcBef>
+                <a:spcPts val="0"/>
+              </a:spcBef>
+              <a:spcAft>
+                <a:spcPts val="0"/>
+              </a:spcAft>
+              <a:buClr>
+                <a:schemeClr val="dk1"/>
+              </a:buClr>
+              <a:buSzPts val="3600"/>
+              <a:buFont typeface="Inconsolata"/>
+              <a:buNone/>
+              <a:defRPr sz="3600" b="1" i="0" u="none" strike="noStrike" cap="none">
+                <a:solidFill>
+                  <a:schemeClr val="dk1"/>
+                </a:solidFill>
+                <a:latin typeface="Inconsolata"/>
+                <a:ea typeface="Inconsolata"/>
+                <a:cs typeface="Inconsolata"/>
+                <a:sym typeface="Inconsolata"/>
+              </a:defRPr>
+            </a:lvl2pPr>
+            <a:lvl3pPr marR="0" lvl="2" algn="ctr" rtl="0">
+              <a:lnSpc>
+                <a:spcPct val="100000"/>
+              </a:lnSpc>
+              <a:spcBef>
+                <a:spcPts val="0"/>
+              </a:spcBef>
+              <a:spcAft>
+                <a:spcPts val="0"/>
+              </a:spcAft>
+              <a:buClr>
+                <a:schemeClr val="dk1"/>
+              </a:buClr>
+              <a:buSzPts val="3600"/>
+              <a:buFont typeface="Inconsolata"/>
+              <a:buNone/>
+              <a:defRPr sz="3600" b="1" i="0" u="none" strike="noStrike" cap="none">
+                <a:solidFill>
+                  <a:schemeClr val="dk1"/>
+                </a:solidFill>
+                <a:latin typeface="Inconsolata"/>
+                <a:ea typeface="Inconsolata"/>
+                <a:cs typeface="Inconsolata"/>
+                <a:sym typeface="Inconsolata"/>
+              </a:defRPr>
+            </a:lvl3pPr>
+            <a:lvl4pPr marR="0" lvl="3" algn="ctr" rtl="0">
+              <a:lnSpc>
+                <a:spcPct val="100000"/>
+              </a:lnSpc>
+              <a:spcBef>
+                <a:spcPts val="0"/>
+              </a:spcBef>
+              <a:spcAft>
+                <a:spcPts val="0"/>
+              </a:spcAft>
+              <a:buClr>
+                <a:schemeClr val="dk1"/>
+              </a:buClr>
+              <a:buSzPts val="3600"/>
+              <a:buFont typeface="Inconsolata"/>
+              <a:buNone/>
+              <a:defRPr sz="3600" b="1" i="0" u="none" strike="noStrike" cap="none">
+                <a:solidFill>
+                  <a:schemeClr val="dk1"/>
+                </a:solidFill>
+                <a:latin typeface="Inconsolata"/>
+                <a:ea typeface="Inconsolata"/>
+                <a:cs typeface="Inconsolata"/>
+                <a:sym typeface="Inconsolata"/>
+              </a:defRPr>
+            </a:lvl4pPr>
+            <a:lvl5pPr marR="0" lvl="4" algn="ctr" rtl="0">
+              <a:lnSpc>
+                <a:spcPct val="100000"/>
+              </a:lnSpc>
+              <a:spcBef>
+                <a:spcPts val="0"/>
+              </a:spcBef>
+              <a:spcAft>
+                <a:spcPts val="0"/>
+              </a:spcAft>
+              <a:buClr>
+                <a:schemeClr val="dk1"/>
+              </a:buClr>
+              <a:buSzPts val="3600"/>
+              <a:buFont typeface="Inconsolata"/>
+              <a:buNone/>
+              <a:defRPr sz="3600" b="1" i="0" u="none" strike="noStrike" cap="none">
+                <a:solidFill>
+                  <a:schemeClr val="dk1"/>
+                </a:solidFill>
+                <a:latin typeface="Inconsolata"/>
+                <a:ea typeface="Inconsolata"/>
+                <a:cs typeface="Inconsolata"/>
+                <a:sym typeface="Inconsolata"/>
+              </a:defRPr>
+            </a:lvl5pPr>
+            <a:lvl6pPr marR="0" lvl="5" algn="ctr" rtl="0">
+              <a:lnSpc>
+                <a:spcPct val="100000"/>
+              </a:lnSpc>
+              <a:spcBef>
+                <a:spcPts val="0"/>
+              </a:spcBef>
+              <a:spcAft>
+                <a:spcPts val="0"/>
+              </a:spcAft>
+              <a:buClr>
+                <a:schemeClr val="dk1"/>
+              </a:buClr>
+              <a:buSzPts val="3600"/>
+              <a:buFont typeface="Inconsolata"/>
+              <a:buNone/>
+              <a:defRPr sz="3600" b="1" i="0" u="none" strike="noStrike" cap="none">
+                <a:solidFill>
+                  <a:schemeClr val="dk1"/>
+                </a:solidFill>
+                <a:latin typeface="Inconsolata"/>
+                <a:ea typeface="Inconsolata"/>
+                <a:cs typeface="Inconsolata"/>
+                <a:sym typeface="Inconsolata"/>
+              </a:defRPr>
+            </a:lvl6pPr>
+            <a:lvl7pPr marR="0" lvl="6" algn="ctr" rtl="0">
+              <a:lnSpc>
+                <a:spcPct val="100000"/>
+              </a:lnSpc>
+              <a:spcBef>
+                <a:spcPts val="0"/>
+              </a:spcBef>
+              <a:spcAft>
+                <a:spcPts val="0"/>
+              </a:spcAft>
+              <a:buClr>
+                <a:schemeClr val="dk1"/>
+              </a:buClr>
+              <a:buSzPts val="3600"/>
+              <a:buFont typeface="Inconsolata"/>
+              <a:buNone/>
+              <a:defRPr sz="3600" b="1" i="0" u="none" strike="noStrike" cap="none">
+                <a:solidFill>
+                  <a:schemeClr val="dk1"/>
+                </a:solidFill>
+                <a:latin typeface="Inconsolata"/>
+                <a:ea typeface="Inconsolata"/>
+                <a:cs typeface="Inconsolata"/>
+                <a:sym typeface="Inconsolata"/>
+              </a:defRPr>
+            </a:lvl7pPr>
+            <a:lvl8pPr marR="0" lvl="7" algn="ctr" rtl="0">
+              <a:lnSpc>
+                <a:spcPct val="100000"/>
+              </a:lnSpc>
+              <a:spcBef>
+                <a:spcPts val="0"/>
+              </a:spcBef>
+              <a:spcAft>
+                <a:spcPts val="0"/>
+              </a:spcAft>
+              <a:buClr>
+                <a:schemeClr val="dk1"/>
+              </a:buClr>
+              <a:buSzPts val="3600"/>
+              <a:buFont typeface="Inconsolata"/>
+              <a:buNone/>
+              <a:defRPr sz="3600" b="1" i="0" u="none" strike="noStrike" cap="none">
+                <a:solidFill>
+                  <a:schemeClr val="dk1"/>
+                </a:solidFill>
+                <a:latin typeface="Inconsolata"/>
+                <a:ea typeface="Inconsolata"/>
+                <a:cs typeface="Inconsolata"/>
+                <a:sym typeface="Inconsolata"/>
+              </a:defRPr>
+            </a:lvl8pPr>
+            <a:lvl9pPr marR="0" lvl="8" algn="ctr" rtl="0">
+              <a:lnSpc>
+                <a:spcPct val="100000"/>
+              </a:lnSpc>
+              <a:spcBef>
+                <a:spcPts val="0"/>
+              </a:spcBef>
+              <a:spcAft>
+                <a:spcPts val="0"/>
+              </a:spcAft>
+              <a:buClr>
+                <a:schemeClr val="dk1"/>
+              </a:buClr>
+              <a:buSzPts val="3600"/>
+              <a:buFont typeface="Inconsolata"/>
+              <a:buNone/>
+              <a:defRPr sz="3600" b="1" i="0" u="none" strike="noStrike" cap="none">
+                <a:solidFill>
+                  <a:schemeClr val="dk1"/>
+                </a:solidFill>
+                <a:latin typeface="Inconsolata"/>
+                <a:ea typeface="Inconsolata"/>
+                <a:cs typeface="Inconsolata"/>
+                <a:sym typeface="Inconsolata"/>
+              </a:defRPr>
+            </a:lvl9pPr>
+          </a:lstStyle>
+          <a:p>
+            <a:r>
+              <a:rPr lang="en-US" sz="3200" dirty="0">
+                <a:solidFill>
+                  <a:srgbClr val="C95EFF"/>
+                </a:solidFill>
+                <a:latin typeface="Spy Agency 3D" pitchFamily="2" charset="0"/>
+              </a:rPr>
+              <a:t>4. Exercises</a:t>
+            </a:r>
+          </a:p>
+        </p:txBody>
+      </p:sp>
+      <p:sp>
+        <p:nvSpPr>
+          <p:cNvPr id="13" name="Footer Placeholder 3">
+            <a:extLst>
+              <a:ext uri="{FF2B5EF4-FFF2-40B4-BE49-F238E27FC236}">
+                <a16:creationId xmlns:a16="http://schemas.microsoft.com/office/drawing/2014/main" id="{CB436D9F-C7C4-49FA-B926-9EA69C93145D}"/>
+              </a:ext>
+            </a:extLst>
+          </p:cNvPr>
+          <p:cNvSpPr>
+            <a:spLocks noGrp="1"/>
+          </p:cNvSpPr>
+          <p:nvPr>
+            <p:ph type="ftr" sz="quarter" idx="10"/>
+          </p:nvPr>
+        </p:nvSpPr>
+        <p:spPr>
+          <a:xfrm>
+            <a:off x="221673" y="694390"/>
+            <a:ext cx="2867891" cy="423914"/>
+          </a:xfrm>
+        </p:spPr>
+        <p:txBody>
+          <a:bodyPr/>
+          <a:lstStyle/>
+          <a:p>
+            <a:r>
+              <a:rPr lang="en-US" sz="2400" b="1" dirty="0">
+                <a:solidFill>
+                  <a:srgbClr val="FF0000"/>
+                </a:solidFill>
+              </a:rPr>
+              <a:t>Reverse a Number</a:t>
+            </a:r>
+          </a:p>
+        </p:txBody>
+      </p:sp>
+      <p:sp>
+        <p:nvSpPr>
+          <p:cNvPr id="10" name="Oval 9">
+            <a:extLst>
+              <a:ext uri="{FF2B5EF4-FFF2-40B4-BE49-F238E27FC236}">
+                <a16:creationId xmlns:a16="http://schemas.microsoft.com/office/drawing/2014/main" id="{DBBF600A-5578-4C30-9F9E-1E98649F01A1}"/>
+              </a:ext>
+            </a:extLst>
+          </p:cNvPr>
+          <p:cNvSpPr/>
+          <p:nvPr/>
+        </p:nvSpPr>
+        <p:spPr>
+          <a:xfrm>
+            <a:off x="5822522" y="694390"/>
+            <a:ext cx="419792" cy="419792"/>
+          </a:xfrm>
+          <a:prstGeom prst="ellipse">
+            <a:avLst/>
+          </a:prstGeom>
+          <a:solidFill>
+            <a:schemeClr val="tx1"/>
+          </a:solidFill>
+          <a:ln>
+            <a:solidFill>
+              <a:schemeClr val="tx1"/>
+            </a:solidFill>
+          </a:ln>
+        </p:spPr>
+        <p:style>
+          <a:lnRef idx="2">
+            <a:schemeClr val="accent1">
+              <a:shade val="50000"/>
+            </a:schemeClr>
+          </a:lnRef>
+          <a:fillRef idx="1">
+            <a:schemeClr val="accent1"/>
+          </a:fillRef>
+          <a:effectRef idx="0">
+            <a:schemeClr val="accent1"/>
+          </a:effectRef>
+          <a:fontRef idx="minor">
+            <a:schemeClr val="lt1"/>
+          </a:fontRef>
+        </p:style>
+        <p:txBody>
+          <a:bodyPr rtlCol="0" anchor="ctr"/>
+          <a:lstStyle/>
+          <a:p>
+            <a:pPr algn="ctr"/>
+            <a:endParaRPr lang="en-US">
+              <a:ln>
+                <a:solidFill>
+                  <a:schemeClr val="accent1"/>
+                </a:solidFill>
+              </a:ln>
+            </a:endParaRPr>
+          </a:p>
+        </p:txBody>
+      </p:sp>
+      <p:sp>
+        <p:nvSpPr>
+          <p:cNvPr id="15" name="Diamond 14">
+            <a:extLst>
+              <a:ext uri="{FF2B5EF4-FFF2-40B4-BE49-F238E27FC236}">
+                <a16:creationId xmlns:a16="http://schemas.microsoft.com/office/drawing/2014/main" id="{522454A1-7B5E-4643-BEE9-AE9F6FEA5FA0}"/>
+              </a:ext>
+            </a:extLst>
+          </p:cNvPr>
+          <p:cNvSpPr/>
+          <p:nvPr/>
+        </p:nvSpPr>
+        <p:spPr>
+          <a:xfrm>
+            <a:off x="5465766" y="1328200"/>
+            <a:ext cx="1133302" cy="670354"/>
+          </a:xfrm>
+          <a:prstGeom prst="diamond">
+            <a:avLst/>
+          </a:prstGeom>
+          <a:solidFill>
+            <a:schemeClr val="tx2"/>
+          </a:solidFill>
+        </p:spPr>
+        <p:style>
+          <a:lnRef idx="2">
+            <a:schemeClr val="accent1">
+              <a:shade val="50000"/>
+            </a:schemeClr>
+          </a:lnRef>
+          <a:fillRef idx="1">
+            <a:schemeClr val="accent1"/>
+          </a:fillRef>
+          <a:effectRef idx="0">
+            <a:schemeClr val="accent1"/>
+          </a:effectRef>
+          <a:fontRef idx="minor">
+            <a:schemeClr val="lt1"/>
+          </a:fontRef>
+        </p:style>
+        <p:txBody>
+          <a:bodyPr rtlCol="0" anchor="ctr"/>
+          <a:lstStyle/>
+          <a:p>
+            <a:pPr algn="ctr"/>
+            <a:r>
+              <a:rPr lang="en-US" sz="1200" dirty="0"/>
+              <a:t>x != 0</a:t>
+            </a:r>
+          </a:p>
+        </p:txBody>
+      </p:sp>
+      <p:sp>
+        <p:nvSpPr>
+          <p:cNvPr id="16" name="Rectangle 15">
+            <a:extLst>
+              <a:ext uri="{FF2B5EF4-FFF2-40B4-BE49-F238E27FC236}">
+                <a16:creationId xmlns:a16="http://schemas.microsoft.com/office/drawing/2014/main" id="{A9235B1C-762E-4EF5-870B-CB05BED88E27}"/>
+              </a:ext>
+            </a:extLst>
+          </p:cNvPr>
+          <p:cNvSpPr/>
+          <p:nvPr/>
+        </p:nvSpPr>
+        <p:spPr>
+          <a:xfrm>
+            <a:off x="5465766" y="2212572"/>
+            <a:ext cx="1133302" cy="670354"/>
+          </a:xfrm>
+          <a:prstGeom prst="rect">
+            <a:avLst/>
+          </a:prstGeom>
+          <a:solidFill>
+            <a:schemeClr val="accent3"/>
+          </a:solidFill>
+        </p:spPr>
+        <p:style>
+          <a:lnRef idx="2">
+            <a:schemeClr val="accent1">
+              <a:shade val="50000"/>
+            </a:schemeClr>
+          </a:lnRef>
+          <a:fillRef idx="1">
+            <a:schemeClr val="accent1"/>
+          </a:fillRef>
+          <a:effectRef idx="0">
+            <a:schemeClr val="accent1"/>
+          </a:effectRef>
+          <a:fontRef idx="minor">
+            <a:schemeClr val="lt1"/>
+          </a:fontRef>
+        </p:style>
+        <p:txBody>
+          <a:bodyPr rtlCol="0" anchor="ctr"/>
+          <a:lstStyle/>
+          <a:p>
+            <a:pPr algn="ctr"/>
+            <a:endParaRPr lang="en-US" sz="1050" b="0" dirty="0">
+              <a:solidFill>
+                <a:srgbClr val="9CDCFE"/>
+              </a:solidFill>
+              <a:effectLst/>
+              <a:latin typeface="Consolas" panose="020B0609020204030204" pitchFamily="49" charset="0"/>
+            </a:endParaRPr>
+          </a:p>
+          <a:p>
+            <a:pPr algn="ctr"/>
+            <a:r>
+              <a:rPr lang="en-US" sz="1050" b="0" dirty="0">
+                <a:solidFill>
+                  <a:schemeClr val="bg1"/>
+                </a:solidFill>
+                <a:effectLst/>
+                <a:latin typeface="Consolas" panose="020B0609020204030204" pitchFamily="49" charset="0"/>
+              </a:rPr>
+              <a:t>reverse = reverse * 10 + x % 10</a:t>
+            </a:r>
+          </a:p>
+          <a:p>
+            <a:pPr algn="ctr"/>
+            <a:endParaRPr lang="en-US" dirty="0"/>
+          </a:p>
+        </p:txBody>
+      </p:sp>
+      <p:sp>
+        <p:nvSpPr>
+          <p:cNvPr id="17" name="Rectangle 16">
+            <a:extLst>
+              <a:ext uri="{FF2B5EF4-FFF2-40B4-BE49-F238E27FC236}">
+                <a16:creationId xmlns:a16="http://schemas.microsoft.com/office/drawing/2014/main" id="{C7AF8D70-C64B-4933-9C7A-BC22FD9B874E}"/>
+              </a:ext>
+            </a:extLst>
+          </p:cNvPr>
+          <p:cNvSpPr/>
+          <p:nvPr/>
+        </p:nvSpPr>
+        <p:spPr>
+          <a:xfrm>
+            <a:off x="5465766" y="3096944"/>
+            <a:ext cx="1133302" cy="670354"/>
+          </a:xfrm>
+          <a:prstGeom prst="rect">
+            <a:avLst/>
+          </a:prstGeom>
+          <a:solidFill>
+            <a:schemeClr val="accent3"/>
+          </a:solidFill>
+        </p:spPr>
+        <p:style>
+          <a:lnRef idx="2">
+            <a:schemeClr val="accent1">
+              <a:shade val="50000"/>
+            </a:schemeClr>
+          </a:lnRef>
+          <a:fillRef idx="1">
+            <a:schemeClr val="accent1"/>
+          </a:fillRef>
+          <a:effectRef idx="0">
+            <a:schemeClr val="accent1"/>
+          </a:effectRef>
+          <a:fontRef idx="minor">
+            <a:schemeClr val="lt1"/>
+          </a:fontRef>
+        </p:style>
+        <p:txBody>
+          <a:bodyPr rtlCol="0" anchor="ctr"/>
+          <a:lstStyle/>
+          <a:p>
+            <a:pPr algn="ctr"/>
+            <a:r>
+              <a:rPr lang="en-US" dirty="0"/>
+              <a:t>x /= 10</a:t>
+            </a:r>
+          </a:p>
+        </p:txBody>
+      </p:sp>
+      <p:sp>
+        <p:nvSpPr>
+          <p:cNvPr id="18" name="Rectangle 17">
+            <a:extLst>
+              <a:ext uri="{FF2B5EF4-FFF2-40B4-BE49-F238E27FC236}">
+                <a16:creationId xmlns:a16="http://schemas.microsoft.com/office/drawing/2014/main" id="{8C6A3193-30A2-4E42-A92A-0C85B3A13D6F}"/>
+              </a:ext>
+            </a:extLst>
+          </p:cNvPr>
+          <p:cNvSpPr/>
+          <p:nvPr/>
+        </p:nvSpPr>
+        <p:spPr>
+          <a:xfrm>
+            <a:off x="5465766" y="3981316"/>
+            <a:ext cx="1133302" cy="670354"/>
+          </a:xfrm>
+          <a:prstGeom prst="rect">
+            <a:avLst/>
+          </a:prstGeom>
+          <a:solidFill>
+            <a:schemeClr val="accent3"/>
+          </a:solidFill>
+        </p:spPr>
+        <p:style>
+          <a:lnRef idx="2">
+            <a:schemeClr val="accent1">
+              <a:shade val="50000"/>
+            </a:schemeClr>
+          </a:lnRef>
+          <a:fillRef idx="1">
+            <a:schemeClr val="accent1"/>
+          </a:fillRef>
+          <a:effectRef idx="0">
+            <a:schemeClr val="accent1"/>
+          </a:effectRef>
+          <a:fontRef idx="minor">
+            <a:schemeClr val="lt1"/>
+          </a:fontRef>
+        </p:style>
+        <p:txBody>
+          <a:bodyPr rtlCol="0" anchor="ctr"/>
+          <a:lstStyle/>
+          <a:p>
+            <a:pPr algn="ctr"/>
+            <a:r>
+              <a:rPr lang="en-US" sz="1200" dirty="0"/>
+              <a:t>return reverse</a:t>
+            </a:r>
+          </a:p>
+        </p:txBody>
+      </p:sp>
+      <p:cxnSp>
+        <p:nvCxnSpPr>
+          <p:cNvPr id="20" name="Straight Arrow Connector 19">
+            <a:extLst>
+              <a:ext uri="{FF2B5EF4-FFF2-40B4-BE49-F238E27FC236}">
+                <a16:creationId xmlns:a16="http://schemas.microsoft.com/office/drawing/2014/main" id="{8836217B-CBA7-4095-BB9B-0F21C84CA63C}"/>
+              </a:ext>
+            </a:extLst>
+          </p:cNvPr>
+          <p:cNvCxnSpPr>
+            <a:stCxn id="10" idx="4"/>
+            <a:endCxn id="15" idx="0"/>
+          </p:cNvCxnSpPr>
+          <p:nvPr/>
+        </p:nvCxnSpPr>
+        <p:spPr>
+          <a:xfrm flipH="1">
+            <a:off x="6032417" y="1114182"/>
+            <a:ext cx="1" cy="214018"/>
+          </a:xfrm>
+          <a:prstGeom prst="straightConnector1">
+            <a:avLst/>
+          </a:prstGeom>
+          <a:ln>
+            <a:tailEnd type="triangle"/>
+          </a:ln>
+        </p:spPr>
+        <p:style>
+          <a:lnRef idx="1">
+            <a:schemeClr val="accent1"/>
+          </a:lnRef>
+          <a:fillRef idx="0">
+            <a:schemeClr val="accent1"/>
+          </a:fillRef>
+          <a:effectRef idx="0">
+            <a:schemeClr val="accent1"/>
+          </a:effectRef>
+          <a:fontRef idx="minor">
+            <a:schemeClr val="tx1"/>
+          </a:fontRef>
+        </p:style>
+      </p:cxnSp>
+      <p:cxnSp>
+        <p:nvCxnSpPr>
+          <p:cNvPr id="22" name="Straight Arrow Connector 21">
+            <a:extLst>
+              <a:ext uri="{FF2B5EF4-FFF2-40B4-BE49-F238E27FC236}">
+                <a16:creationId xmlns:a16="http://schemas.microsoft.com/office/drawing/2014/main" id="{63C2498F-B9FB-4C95-9E57-01F3A52CCBDB}"/>
+              </a:ext>
+            </a:extLst>
+          </p:cNvPr>
+          <p:cNvCxnSpPr>
+            <a:stCxn id="15" idx="2"/>
+            <a:endCxn id="16" idx="0"/>
+          </p:cNvCxnSpPr>
+          <p:nvPr/>
+        </p:nvCxnSpPr>
+        <p:spPr>
+          <a:xfrm>
+            <a:off x="6032417" y="1998554"/>
+            <a:ext cx="0" cy="214018"/>
+          </a:xfrm>
+          <a:prstGeom prst="straightConnector1">
+            <a:avLst/>
+          </a:prstGeom>
+          <a:ln>
+            <a:tailEnd type="triangle"/>
+          </a:ln>
+        </p:spPr>
+        <p:style>
+          <a:lnRef idx="1">
+            <a:schemeClr val="accent1"/>
+          </a:lnRef>
+          <a:fillRef idx="0">
+            <a:schemeClr val="accent1"/>
+          </a:fillRef>
+          <a:effectRef idx="0">
+            <a:schemeClr val="accent1"/>
+          </a:effectRef>
+          <a:fontRef idx="minor">
+            <a:schemeClr val="tx1"/>
+          </a:fontRef>
+        </p:style>
+      </p:cxnSp>
+      <p:cxnSp>
+        <p:nvCxnSpPr>
+          <p:cNvPr id="24" name="Straight Arrow Connector 23">
+            <a:extLst>
+              <a:ext uri="{FF2B5EF4-FFF2-40B4-BE49-F238E27FC236}">
+                <a16:creationId xmlns:a16="http://schemas.microsoft.com/office/drawing/2014/main" id="{82D8CA06-F087-407E-A28A-C5A53A5DBD75}"/>
+              </a:ext>
+            </a:extLst>
+          </p:cNvPr>
+          <p:cNvCxnSpPr>
+            <a:stCxn id="16" idx="2"/>
+            <a:endCxn id="17" idx="0"/>
+          </p:cNvCxnSpPr>
+          <p:nvPr/>
+        </p:nvCxnSpPr>
+        <p:spPr>
+          <a:xfrm>
+            <a:off x="6032417" y="2882926"/>
+            <a:ext cx="0" cy="214018"/>
+          </a:xfrm>
+          <a:prstGeom prst="straightConnector1">
+            <a:avLst/>
+          </a:prstGeom>
+          <a:ln>
+            <a:tailEnd type="triangle"/>
+          </a:ln>
+        </p:spPr>
+        <p:style>
+          <a:lnRef idx="1">
+            <a:schemeClr val="accent1"/>
+          </a:lnRef>
+          <a:fillRef idx="0">
+            <a:schemeClr val="accent1"/>
+          </a:fillRef>
+          <a:effectRef idx="0">
+            <a:schemeClr val="accent1"/>
+          </a:effectRef>
+          <a:fontRef idx="minor">
+            <a:schemeClr val="tx1"/>
+          </a:fontRef>
+        </p:style>
+      </p:cxnSp>
+      <p:cxnSp>
+        <p:nvCxnSpPr>
+          <p:cNvPr id="28" name="Connector: Elbow 27">
+            <a:extLst>
+              <a:ext uri="{FF2B5EF4-FFF2-40B4-BE49-F238E27FC236}">
+                <a16:creationId xmlns:a16="http://schemas.microsoft.com/office/drawing/2014/main" id="{8B211DD4-1882-4A05-ABAC-AEB7A2E7BDB4}"/>
+              </a:ext>
+            </a:extLst>
+          </p:cNvPr>
+          <p:cNvCxnSpPr>
+            <a:stCxn id="15" idx="1"/>
+            <a:endCxn id="18" idx="1"/>
+          </p:cNvCxnSpPr>
+          <p:nvPr/>
+        </p:nvCxnSpPr>
+        <p:spPr>
+          <a:xfrm rot="10800000" flipV="1">
+            <a:off x="5465766" y="1663377"/>
+            <a:ext cx="12700" cy="2653116"/>
+          </a:xfrm>
+          <a:prstGeom prst="bentConnector3">
+            <a:avLst>
+              <a:gd name="adj1" fmla="val 4472732"/>
+            </a:avLst>
+          </a:prstGeom>
+          <a:ln>
+            <a:tailEnd type="triangle"/>
+          </a:ln>
+        </p:spPr>
+        <p:style>
+          <a:lnRef idx="1">
+            <a:schemeClr val="accent1"/>
+          </a:lnRef>
+          <a:fillRef idx="0">
+            <a:schemeClr val="accent1"/>
+          </a:fillRef>
+          <a:effectRef idx="0">
+            <a:schemeClr val="accent1"/>
+          </a:effectRef>
+          <a:fontRef idx="minor">
+            <a:schemeClr val="tx1"/>
+          </a:fontRef>
+        </p:style>
+      </p:cxnSp>
+      <p:sp>
+        <p:nvSpPr>
+          <p:cNvPr id="31" name="TextBox 30">
+            <a:extLst>
+              <a:ext uri="{FF2B5EF4-FFF2-40B4-BE49-F238E27FC236}">
+                <a16:creationId xmlns:a16="http://schemas.microsoft.com/office/drawing/2014/main" id="{7E7D1DAC-F6CA-4144-A522-EDB1CF6DFD76}"/>
+              </a:ext>
+            </a:extLst>
+          </p:cNvPr>
+          <p:cNvSpPr txBox="1"/>
+          <p:nvPr/>
+        </p:nvSpPr>
+        <p:spPr>
+          <a:xfrm>
+            <a:off x="4950254" y="1355600"/>
+            <a:ext cx="635776" cy="307777"/>
+          </a:xfrm>
+          <a:prstGeom prst="rect">
+            <a:avLst/>
+          </a:prstGeom>
+          <a:noFill/>
+        </p:spPr>
+        <p:txBody>
+          <a:bodyPr wrap="square" rtlCol="0">
+            <a:spAutoFit/>
+          </a:bodyPr>
+          <a:lstStyle/>
+          <a:p>
+            <a:r>
+              <a:rPr lang="en-US" dirty="0"/>
+              <a:t>Nope</a:t>
+            </a:r>
+          </a:p>
+        </p:txBody>
+      </p:sp>
+      <p:sp>
+        <p:nvSpPr>
+          <p:cNvPr id="32" name="TextBox 31">
+            <a:extLst>
+              <a:ext uri="{FF2B5EF4-FFF2-40B4-BE49-F238E27FC236}">
+                <a16:creationId xmlns:a16="http://schemas.microsoft.com/office/drawing/2014/main" id="{83AC5A80-470A-4919-BBCA-9A1CA726E495}"/>
+              </a:ext>
+            </a:extLst>
+          </p:cNvPr>
+          <p:cNvSpPr txBox="1"/>
+          <p:nvPr/>
+        </p:nvSpPr>
+        <p:spPr>
+          <a:xfrm>
+            <a:off x="6003553" y="1917992"/>
+            <a:ext cx="635776" cy="307777"/>
+          </a:xfrm>
+          <a:prstGeom prst="rect">
+            <a:avLst/>
+          </a:prstGeom>
+          <a:noFill/>
+        </p:spPr>
+        <p:txBody>
+          <a:bodyPr wrap="square" rtlCol="0">
+            <a:spAutoFit/>
+          </a:bodyPr>
+          <a:lstStyle/>
+          <a:p>
+            <a:r>
+              <a:rPr lang="en-US" dirty="0"/>
+              <a:t>Yes</a:t>
+            </a:r>
+          </a:p>
+        </p:txBody>
+      </p:sp>
+      <p:cxnSp>
+        <p:nvCxnSpPr>
+          <p:cNvPr id="34" name="Connector: Elbow 33">
+            <a:extLst>
+              <a:ext uri="{FF2B5EF4-FFF2-40B4-BE49-F238E27FC236}">
+                <a16:creationId xmlns:a16="http://schemas.microsoft.com/office/drawing/2014/main" id="{D99A907B-A17C-4FC8-A3C6-0D7810708224}"/>
+              </a:ext>
+            </a:extLst>
+          </p:cNvPr>
+          <p:cNvCxnSpPr>
+            <a:stCxn id="17" idx="3"/>
+            <a:endCxn id="15" idx="3"/>
+          </p:cNvCxnSpPr>
+          <p:nvPr/>
+        </p:nvCxnSpPr>
+        <p:spPr>
+          <a:xfrm flipV="1">
+            <a:off x="6599068" y="1663377"/>
+            <a:ext cx="12700" cy="1768744"/>
+          </a:xfrm>
+          <a:prstGeom prst="bentConnector3">
+            <a:avLst>
+              <a:gd name="adj1" fmla="val 3927268"/>
+            </a:avLst>
+          </a:prstGeom>
+          <a:ln>
+            <a:tailEnd type="triangle"/>
+          </a:ln>
+        </p:spPr>
+        <p:style>
+          <a:lnRef idx="1">
+            <a:schemeClr val="accent1"/>
+          </a:lnRef>
+          <a:fillRef idx="0">
+            <a:schemeClr val="accent1"/>
+          </a:fillRef>
+          <a:effectRef idx="0">
+            <a:schemeClr val="accent1"/>
+          </a:effectRef>
+          <a:fontRef idx="minor">
+            <a:schemeClr val="tx1"/>
+          </a:fontRef>
+        </p:style>
+      </p:cxnSp>
+    </p:spTree>
+    <p:extLst>
+      <p:ext uri="{BB962C8B-B14F-4D97-AF65-F5344CB8AC3E}">
+        <p14:creationId xmlns:p14="http://schemas.microsoft.com/office/powerpoint/2010/main" val="4278441258"/>
+      </p:ext>
+    </p:extLst>
+  </p:cSld>
+  <p:clrMapOvr>
+    <a:masterClrMapping/>
+  </p:clrMapOvr>
+</p:sld>
+</file>
+
+<file path=ppt/slides/slide25.xml><?xml version="1.0" encoding="utf-8"?>
+<p:sld xmlns:a="http://schemas.openxmlformats.org/drawingml/2006/main" xmlns:r="http://schemas.openxmlformats.org/officeDocument/2006/relationships" xmlns:p="http://schemas.openxmlformats.org/presentationml/2006/main">
+  <p:cSld>
+    <p:spTree>
+      <p:nvGrpSpPr>
+        <p:cNvPr id="1" name=""/>
+        <p:cNvGrpSpPr/>
+        <p:nvPr/>
+      </p:nvGrpSpPr>
+      <p:grpSpPr>
+        <a:xfrm>
+          <a:off x="0" y="0"/>
+          <a:ext cx="0" cy="0"/>
+          <a:chOff x="0" y="0"/>
+          <a:chExt cx="0" cy="0"/>
+        </a:xfrm>
+      </p:grpSpPr>
+      <p:sp>
+        <p:nvSpPr>
+          <p:cNvPr id="2" name="Slide Number Placeholder 1">
+            <a:extLst>
+              <a:ext uri="{FF2B5EF4-FFF2-40B4-BE49-F238E27FC236}">
+                <a16:creationId xmlns:a16="http://schemas.microsoft.com/office/drawing/2014/main" id="{F0E9E79F-BAA5-4481-B2DE-5A5D2AAAB517}"/>
+              </a:ext>
+            </a:extLst>
+          </p:cNvPr>
+          <p:cNvSpPr>
+            <a:spLocks noGrp="1"/>
+          </p:cNvSpPr>
+          <p:nvPr>
+            <p:ph type="sldNum" sz="quarter" idx="11"/>
+          </p:nvPr>
+        </p:nvSpPr>
+        <p:spPr/>
+        <p:txBody>
+          <a:bodyPr/>
+          <a:lstStyle/>
+          <a:p>
+            <a:fld id="{54586125-9BB9-47C9-A1C0-5B3BEBE258A1}" type="slidenum">
+              <a:rPr lang="en-US" smtClean="0"/>
+              <a:t>25</a:t>
+            </a:fld>
+            <a:endParaRPr lang="en-US"/>
+          </a:p>
+        </p:txBody>
+      </p:sp>
+      <p:cxnSp>
+        <p:nvCxnSpPr>
+          <p:cNvPr id="3" name="Google Shape;413;p66">
+            <a:extLst>
+              <a:ext uri="{FF2B5EF4-FFF2-40B4-BE49-F238E27FC236}">
+                <a16:creationId xmlns:a16="http://schemas.microsoft.com/office/drawing/2014/main" id="{888B6229-90BF-496A-9A39-6C2BF18692D6}"/>
+              </a:ext>
+            </a:extLst>
+          </p:cNvPr>
+          <p:cNvCxnSpPr>
+            <a:cxnSpLocks/>
+          </p:cNvCxnSpPr>
+          <p:nvPr/>
+        </p:nvCxnSpPr>
+        <p:spPr>
+          <a:xfrm>
+            <a:off x="7277493" y="430025"/>
+            <a:ext cx="1884582" cy="0"/>
+          </a:xfrm>
+          <a:prstGeom prst="straightConnector1">
+            <a:avLst/>
+          </a:prstGeom>
+          <a:noFill/>
+          <a:ln w="9525" cap="flat" cmpd="sng">
+            <a:solidFill>
+              <a:schemeClr val="accent2"/>
+            </a:solidFill>
+            <a:prstDash val="solid"/>
+            <a:round/>
+            <a:headEnd type="none" w="med" len="med"/>
+            <a:tailEnd type="none" w="med" len="med"/>
+          </a:ln>
+        </p:spPr>
+      </p:cxnSp>
+      <p:sp>
+        <p:nvSpPr>
+          <p:cNvPr id="12" name="Title 1">
+            <a:extLst>
+              <a:ext uri="{FF2B5EF4-FFF2-40B4-BE49-F238E27FC236}">
+                <a16:creationId xmlns:a16="http://schemas.microsoft.com/office/drawing/2014/main" id="{669B6B9A-114E-4164-9D9C-67C30657CC88}"/>
+              </a:ext>
+            </a:extLst>
+          </p:cNvPr>
+          <p:cNvSpPr txBox="1">
+            <a:spLocks/>
+          </p:cNvSpPr>
+          <p:nvPr/>
+        </p:nvSpPr>
+        <p:spPr>
+          <a:xfrm>
+            <a:off x="3482340" y="155904"/>
+            <a:ext cx="3571604" cy="538486"/>
+          </a:xfrm>
+          <a:prstGeom prst="rect">
+            <a:avLst/>
+          </a:prstGeom>
+          <a:noFill/>
+          <a:ln>
+            <a:noFill/>
+          </a:ln>
+        </p:spPr>
+        <p:txBody>
+          <a:bodyPr spcFirstLastPara="1" wrap="square" lIns="91425" tIns="91425" rIns="91425" bIns="91425" anchor="t" anchorCtr="0">
+            <a:normAutofit fontScale="92500" lnSpcReduction="10000"/>
+          </a:bodyPr>
+          <a:lstStyle>
+            <a:defPPr marR="0" lvl="0" algn="l" rtl="0">
+              <a:lnSpc>
+                <a:spcPct val="100000"/>
+              </a:lnSpc>
+              <a:spcBef>
+                <a:spcPts val="0"/>
+              </a:spcBef>
+              <a:spcAft>
+                <a:spcPts val="0"/>
+              </a:spcAft>
+            </a:defPPr>
+            <a:lvl1pPr marR="0" lvl="0" algn="l" rtl="0">
+              <a:lnSpc>
+                <a:spcPct val="80000"/>
+              </a:lnSpc>
+              <a:spcBef>
+                <a:spcPts val="0"/>
+              </a:spcBef>
+              <a:spcAft>
+                <a:spcPts val="0"/>
+              </a:spcAft>
+              <a:buClr>
+                <a:schemeClr val="dk1"/>
+              </a:buClr>
+              <a:buSzPts val="3600"/>
+              <a:buFont typeface="Inconsolata"/>
+              <a:buNone/>
+              <a:defRPr sz="4000" b="1" i="0" u="none" strike="noStrike" cap="none">
+                <a:solidFill>
+                  <a:schemeClr val="dk1"/>
+                </a:solidFill>
+                <a:latin typeface="Inconsolata"/>
+                <a:ea typeface="Inconsolata"/>
+                <a:cs typeface="Inconsolata"/>
+                <a:sym typeface="Inconsolata"/>
+              </a:defRPr>
+            </a:lvl1pPr>
+            <a:lvl2pPr marR="0" lvl="1" algn="ctr" rtl="0">
+              <a:lnSpc>
+                <a:spcPct val="100000"/>
+              </a:lnSpc>
+              <a:spcBef>
+                <a:spcPts val="0"/>
+              </a:spcBef>
+              <a:spcAft>
+                <a:spcPts val="0"/>
+              </a:spcAft>
+              <a:buClr>
+                <a:schemeClr val="dk1"/>
+              </a:buClr>
+              <a:buSzPts val="3600"/>
+              <a:buFont typeface="Inconsolata"/>
+              <a:buNone/>
+              <a:defRPr sz="3600" b="1" i="0" u="none" strike="noStrike" cap="none">
+                <a:solidFill>
+                  <a:schemeClr val="dk1"/>
+                </a:solidFill>
+                <a:latin typeface="Inconsolata"/>
+                <a:ea typeface="Inconsolata"/>
+                <a:cs typeface="Inconsolata"/>
+                <a:sym typeface="Inconsolata"/>
+              </a:defRPr>
+            </a:lvl2pPr>
+            <a:lvl3pPr marR="0" lvl="2" algn="ctr" rtl="0">
+              <a:lnSpc>
+                <a:spcPct val="100000"/>
+              </a:lnSpc>
+              <a:spcBef>
+                <a:spcPts val="0"/>
+              </a:spcBef>
+              <a:spcAft>
+                <a:spcPts val="0"/>
+              </a:spcAft>
+              <a:buClr>
+                <a:schemeClr val="dk1"/>
+              </a:buClr>
+              <a:buSzPts val="3600"/>
+              <a:buFont typeface="Inconsolata"/>
+              <a:buNone/>
+              <a:defRPr sz="3600" b="1" i="0" u="none" strike="noStrike" cap="none">
+                <a:solidFill>
+                  <a:schemeClr val="dk1"/>
+                </a:solidFill>
+                <a:latin typeface="Inconsolata"/>
+                <a:ea typeface="Inconsolata"/>
+                <a:cs typeface="Inconsolata"/>
+                <a:sym typeface="Inconsolata"/>
+              </a:defRPr>
+            </a:lvl3pPr>
+            <a:lvl4pPr marR="0" lvl="3" algn="ctr" rtl="0">
+              <a:lnSpc>
+                <a:spcPct val="100000"/>
+              </a:lnSpc>
+              <a:spcBef>
+                <a:spcPts val="0"/>
+              </a:spcBef>
+              <a:spcAft>
+                <a:spcPts val="0"/>
+              </a:spcAft>
+              <a:buClr>
+                <a:schemeClr val="dk1"/>
+              </a:buClr>
+              <a:buSzPts val="3600"/>
+              <a:buFont typeface="Inconsolata"/>
+              <a:buNone/>
+              <a:defRPr sz="3600" b="1" i="0" u="none" strike="noStrike" cap="none">
+                <a:solidFill>
+                  <a:schemeClr val="dk1"/>
+                </a:solidFill>
+                <a:latin typeface="Inconsolata"/>
+                <a:ea typeface="Inconsolata"/>
+                <a:cs typeface="Inconsolata"/>
+                <a:sym typeface="Inconsolata"/>
+              </a:defRPr>
+            </a:lvl4pPr>
+            <a:lvl5pPr marR="0" lvl="4" algn="ctr" rtl="0">
+              <a:lnSpc>
+                <a:spcPct val="100000"/>
+              </a:lnSpc>
+              <a:spcBef>
+                <a:spcPts val="0"/>
+              </a:spcBef>
+              <a:spcAft>
+                <a:spcPts val="0"/>
+              </a:spcAft>
+              <a:buClr>
+                <a:schemeClr val="dk1"/>
+              </a:buClr>
+              <a:buSzPts val="3600"/>
+              <a:buFont typeface="Inconsolata"/>
+              <a:buNone/>
+              <a:defRPr sz="3600" b="1" i="0" u="none" strike="noStrike" cap="none">
+                <a:solidFill>
+                  <a:schemeClr val="dk1"/>
+                </a:solidFill>
+                <a:latin typeface="Inconsolata"/>
+                <a:ea typeface="Inconsolata"/>
+                <a:cs typeface="Inconsolata"/>
+                <a:sym typeface="Inconsolata"/>
+              </a:defRPr>
+            </a:lvl5pPr>
+            <a:lvl6pPr marR="0" lvl="5" algn="ctr" rtl="0">
+              <a:lnSpc>
+                <a:spcPct val="100000"/>
+              </a:lnSpc>
+              <a:spcBef>
+                <a:spcPts val="0"/>
+              </a:spcBef>
+              <a:spcAft>
+                <a:spcPts val="0"/>
+              </a:spcAft>
+              <a:buClr>
+                <a:schemeClr val="dk1"/>
+              </a:buClr>
+              <a:buSzPts val="3600"/>
+              <a:buFont typeface="Inconsolata"/>
+              <a:buNone/>
+              <a:defRPr sz="3600" b="1" i="0" u="none" strike="noStrike" cap="none">
+                <a:solidFill>
+                  <a:schemeClr val="dk1"/>
+                </a:solidFill>
+                <a:latin typeface="Inconsolata"/>
+                <a:ea typeface="Inconsolata"/>
+                <a:cs typeface="Inconsolata"/>
+                <a:sym typeface="Inconsolata"/>
+              </a:defRPr>
+            </a:lvl6pPr>
+            <a:lvl7pPr marR="0" lvl="6" algn="ctr" rtl="0">
+              <a:lnSpc>
+                <a:spcPct val="100000"/>
+              </a:lnSpc>
+              <a:spcBef>
+                <a:spcPts val="0"/>
+              </a:spcBef>
+              <a:spcAft>
+                <a:spcPts val="0"/>
+              </a:spcAft>
+              <a:buClr>
+                <a:schemeClr val="dk1"/>
+              </a:buClr>
+              <a:buSzPts val="3600"/>
+              <a:buFont typeface="Inconsolata"/>
+              <a:buNone/>
+              <a:defRPr sz="3600" b="1" i="0" u="none" strike="noStrike" cap="none">
+                <a:solidFill>
+                  <a:schemeClr val="dk1"/>
+                </a:solidFill>
+                <a:latin typeface="Inconsolata"/>
+                <a:ea typeface="Inconsolata"/>
+                <a:cs typeface="Inconsolata"/>
+                <a:sym typeface="Inconsolata"/>
+              </a:defRPr>
+            </a:lvl7pPr>
+            <a:lvl8pPr marR="0" lvl="7" algn="ctr" rtl="0">
+              <a:lnSpc>
+                <a:spcPct val="100000"/>
+              </a:lnSpc>
+              <a:spcBef>
+                <a:spcPts val="0"/>
+              </a:spcBef>
+              <a:spcAft>
+                <a:spcPts val="0"/>
+              </a:spcAft>
+              <a:buClr>
+                <a:schemeClr val="dk1"/>
+              </a:buClr>
+              <a:buSzPts val="3600"/>
+              <a:buFont typeface="Inconsolata"/>
+              <a:buNone/>
+              <a:defRPr sz="3600" b="1" i="0" u="none" strike="noStrike" cap="none">
+                <a:solidFill>
+                  <a:schemeClr val="dk1"/>
+                </a:solidFill>
+                <a:latin typeface="Inconsolata"/>
+                <a:ea typeface="Inconsolata"/>
+                <a:cs typeface="Inconsolata"/>
+                <a:sym typeface="Inconsolata"/>
+              </a:defRPr>
+            </a:lvl8pPr>
+            <a:lvl9pPr marR="0" lvl="8" algn="ctr" rtl="0">
+              <a:lnSpc>
+                <a:spcPct val="100000"/>
+              </a:lnSpc>
+              <a:spcBef>
+                <a:spcPts val="0"/>
+              </a:spcBef>
+              <a:spcAft>
+                <a:spcPts val="0"/>
+              </a:spcAft>
+              <a:buClr>
+                <a:schemeClr val="dk1"/>
+              </a:buClr>
+              <a:buSzPts val="3600"/>
+              <a:buFont typeface="Inconsolata"/>
+              <a:buNone/>
+              <a:defRPr sz="3600" b="1" i="0" u="none" strike="noStrike" cap="none">
+                <a:solidFill>
+                  <a:schemeClr val="dk1"/>
+                </a:solidFill>
+                <a:latin typeface="Inconsolata"/>
+                <a:ea typeface="Inconsolata"/>
+                <a:cs typeface="Inconsolata"/>
+                <a:sym typeface="Inconsolata"/>
+              </a:defRPr>
+            </a:lvl9pPr>
+          </a:lstStyle>
+          <a:p>
+            <a:r>
+              <a:rPr lang="en-US" sz="3200" dirty="0">
+                <a:solidFill>
+                  <a:srgbClr val="C95EFF"/>
+                </a:solidFill>
+                <a:latin typeface="Spy Agency 3D" pitchFamily="2" charset="0"/>
+              </a:rPr>
+              <a:t>4. Exercises</a:t>
+            </a:r>
+          </a:p>
+        </p:txBody>
+      </p:sp>
+      <p:pic>
+        <p:nvPicPr>
+          <p:cNvPr id="6" name="Picture 5">
+            <a:extLst>
+              <a:ext uri="{FF2B5EF4-FFF2-40B4-BE49-F238E27FC236}">
+                <a16:creationId xmlns:a16="http://schemas.microsoft.com/office/drawing/2014/main" id="{B06DB982-F48D-4A31-B929-A7F404A2345A}"/>
+              </a:ext>
+            </a:extLst>
+          </p:cNvPr>
+          <p:cNvPicPr>
+            <a:picLocks noChangeAspect="1"/>
+          </p:cNvPicPr>
+          <p:nvPr/>
+        </p:nvPicPr>
+        <p:blipFill>
+          <a:blip r:embed="rId2"/>
+          <a:stretch>
+            <a:fillRect/>
+          </a:stretch>
+        </p:blipFill>
+        <p:spPr>
+          <a:xfrm>
+            <a:off x="1298269" y="694390"/>
+            <a:ext cx="3081395" cy="4325261"/>
+          </a:xfrm>
+          <a:prstGeom prst="rect">
+            <a:avLst/>
+          </a:prstGeom>
+        </p:spPr>
+      </p:pic>
+      <p:pic>
+        <p:nvPicPr>
+          <p:cNvPr id="8" name="Picture 7">
+            <a:extLst>
+              <a:ext uri="{FF2B5EF4-FFF2-40B4-BE49-F238E27FC236}">
+                <a16:creationId xmlns:a16="http://schemas.microsoft.com/office/drawing/2014/main" id="{208D6956-7D22-434A-A6B1-E780C9006563}"/>
+              </a:ext>
+            </a:extLst>
+          </p:cNvPr>
+          <p:cNvPicPr>
+            <a:picLocks noChangeAspect="1"/>
+          </p:cNvPicPr>
+          <p:nvPr/>
+        </p:nvPicPr>
+        <p:blipFill>
+          <a:blip r:embed="rId3"/>
+          <a:stretch>
+            <a:fillRect/>
+          </a:stretch>
+        </p:blipFill>
+        <p:spPr>
+          <a:xfrm>
+            <a:off x="4572000" y="2302508"/>
+            <a:ext cx="3051402" cy="538483"/>
+          </a:xfrm>
+          <a:prstGeom prst="rect">
+            <a:avLst/>
+          </a:prstGeom>
+        </p:spPr>
+      </p:pic>
+      <p:sp>
+        <p:nvSpPr>
+          <p:cNvPr id="13" name="Footer Placeholder 3">
+            <a:extLst>
+              <a:ext uri="{FF2B5EF4-FFF2-40B4-BE49-F238E27FC236}">
+                <a16:creationId xmlns:a16="http://schemas.microsoft.com/office/drawing/2014/main" id="{CB436D9F-C7C4-49FA-B926-9EA69C93145D}"/>
+              </a:ext>
+            </a:extLst>
+          </p:cNvPr>
+          <p:cNvSpPr>
+            <a:spLocks noGrp="1"/>
+          </p:cNvSpPr>
+          <p:nvPr>
+            <p:ph type="ftr" sz="quarter" idx="10"/>
+          </p:nvPr>
+        </p:nvSpPr>
+        <p:spPr>
+          <a:xfrm>
+            <a:off x="4572000" y="1242350"/>
+            <a:ext cx="2867891" cy="423914"/>
+          </a:xfrm>
+        </p:spPr>
+        <p:txBody>
+          <a:bodyPr/>
+          <a:lstStyle/>
+          <a:p>
+            <a:r>
+              <a:rPr lang="en-US" sz="2400" b="1" dirty="0">
+                <a:solidFill>
+                  <a:srgbClr val="FF0000"/>
+                </a:solidFill>
+              </a:rPr>
+              <a:t>Reverse a Number</a:t>
+            </a:r>
+          </a:p>
+        </p:txBody>
+      </p:sp>
+    </p:spTree>
+    <p:extLst>
+      <p:ext uri="{BB962C8B-B14F-4D97-AF65-F5344CB8AC3E}">
+        <p14:creationId xmlns:p14="http://schemas.microsoft.com/office/powerpoint/2010/main" val="578460551"/>
+      </p:ext>
+    </p:extLst>
+  </p:cSld>
+  <p:clrMapOvr>
+    <a:masterClrMapping/>
+  </p:clrMapOvr>
+</p:sld>
+</file>
+
+<file path=ppt/slides/slide26.xml><?xml version="1.0" encoding="utf-8"?>
+<p:sld xmlns:a="http://schemas.openxmlformats.org/drawingml/2006/main" xmlns:r="http://schemas.openxmlformats.org/officeDocument/2006/relationships" xmlns:p="http://schemas.openxmlformats.org/presentationml/2006/main">
+  <p:cSld>
+    <p:spTree>
+      <p:nvGrpSpPr>
+        <p:cNvPr id="1" name=""/>
+        <p:cNvGrpSpPr/>
+        <p:nvPr/>
+      </p:nvGrpSpPr>
+      <p:grpSpPr>
+        <a:xfrm>
+          <a:off x="0" y="0"/>
+          <a:ext cx="0" cy="0"/>
+          <a:chOff x="0" y="0"/>
+          <a:chExt cx="0" cy="0"/>
+        </a:xfrm>
+      </p:grpSpPr>
+      <p:sp>
+        <p:nvSpPr>
+          <p:cNvPr id="2" name="Slide Number Placeholder 1">
+            <a:extLst>
+              <a:ext uri="{FF2B5EF4-FFF2-40B4-BE49-F238E27FC236}">
+                <a16:creationId xmlns:a16="http://schemas.microsoft.com/office/drawing/2014/main" id="{F0E9E79F-BAA5-4481-B2DE-5A5D2AAAB517}"/>
+              </a:ext>
+            </a:extLst>
+          </p:cNvPr>
+          <p:cNvSpPr>
+            <a:spLocks noGrp="1"/>
+          </p:cNvSpPr>
+          <p:nvPr>
+            <p:ph type="sldNum" sz="quarter" idx="11"/>
+          </p:nvPr>
+        </p:nvSpPr>
+        <p:spPr/>
+        <p:txBody>
+          <a:bodyPr/>
+          <a:lstStyle/>
+          <a:p>
+            <a:fld id="{54586125-9BB9-47C9-A1C0-5B3BEBE258A1}" type="slidenum">
+              <a:rPr lang="en-US" smtClean="0"/>
+              <a:t>26</a:t>
+            </a:fld>
+            <a:endParaRPr lang="en-US"/>
+          </a:p>
+        </p:txBody>
+      </p:sp>
+      <p:cxnSp>
+        <p:nvCxnSpPr>
+          <p:cNvPr id="3" name="Google Shape;413;p66">
+            <a:extLst>
+              <a:ext uri="{FF2B5EF4-FFF2-40B4-BE49-F238E27FC236}">
+                <a16:creationId xmlns:a16="http://schemas.microsoft.com/office/drawing/2014/main" id="{888B6229-90BF-496A-9A39-6C2BF18692D6}"/>
+              </a:ext>
+            </a:extLst>
+          </p:cNvPr>
+          <p:cNvCxnSpPr>
+            <a:cxnSpLocks/>
+          </p:cNvCxnSpPr>
+          <p:nvPr/>
+        </p:nvCxnSpPr>
+        <p:spPr>
+          <a:xfrm>
+            <a:off x="7277493" y="430025"/>
+            <a:ext cx="1884582" cy="0"/>
+          </a:xfrm>
+          <a:prstGeom prst="straightConnector1">
+            <a:avLst/>
+          </a:prstGeom>
+          <a:noFill/>
+          <a:ln w="9525" cap="flat" cmpd="sng">
+            <a:solidFill>
+              <a:schemeClr val="accent2"/>
+            </a:solidFill>
+            <a:prstDash val="solid"/>
+            <a:round/>
+            <a:headEnd type="none" w="med" len="med"/>
+            <a:tailEnd type="none" w="med" len="med"/>
+          </a:ln>
+        </p:spPr>
+      </p:cxnSp>
+      <p:sp>
+        <p:nvSpPr>
+          <p:cNvPr id="12" name="Title 1">
+            <a:extLst>
+              <a:ext uri="{FF2B5EF4-FFF2-40B4-BE49-F238E27FC236}">
+                <a16:creationId xmlns:a16="http://schemas.microsoft.com/office/drawing/2014/main" id="{669B6B9A-114E-4164-9D9C-67C30657CC88}"/>
+              </a:ext>
+            </a:extLst>
+          </p:cNvPr>
+          <p:cNvSpPr txBox="1">
+            <a:spLocks/>
+          </p:cNvSpPr>
+          <p:nvPr/>
+        </p:nvSpPr>
+        <p:spPr>
+          <a:xfrm>
+            <a:off x="3482340" y="155904"/>
+            <a:ext cx="3571604" cy="538486"/>
+          </a:xfrm>
+          <a:prstGeom prst="rect">
+            <a:avLst/>
+          </a:prstGeom>
+          <a:noFill/>
+          <a:ln>
+            <a:noFill/>
+          </a:ln>
+        </p:spPr>
+        <p:txBody>
+          <a:bodyPr spcFirstLastPara="1" wrap="square" lIns="91425" tIns="91425" rIns="91425" bIns="91425" anchor="t" anchorCtr="0">
+            <a:normAutofit fontScale="92500" lnSpcReduction="10000"/>
+          </a:bodyPr>
+          <a:lstStyle>
+            <a:defPPr marR="0" lvl="0" algn="l" rtl="0">
+              <a:lnSpc>
+                <a:spcPct val="100000"/>
+              </a:lnSpc>
+              <a:spcBef>
+                <a:spcPts val="0"/>
+              </a:spcBef>
+              <a:spcAft>
+                <a:spcPts val="0"/>
+              </a:spcAft>
+            </a:defPPr>
+            <a:lvl1pPr marR="0" lvl="0" algn="l" rtl="0">
+              <a:lnSpc>
+                <a:spcPct val="80000"/>
+              </a:lnSpc>
+              <a:spcBef>
+                <a:spcPts val="0"/>
+              </a:spcBef>
+              <a:spcAft>
+                <a:spcPts val="0"/>
+              </a:spcAft>
+              <a:buClr>
+                <a:schemeClr val="dk1"/>
+              </a:buClr>
+              <a:buSzPts val="3600"/>
+              <a:buFont typeface="Inconsolata"/>
+              <a:buNone/>
+              <a:defRPr sz="4000" b="1" i="0" u="none" strike="noStrike" cap="none">
+                <a:solidFill>
+                  <a:schemeClr val="dk1"/>
+                </a:solidFill>
+                <a:latin typeface="Inconsolata"/>
+                <a:ea typeface="Inconsolata"/>
+                <a:cs typeface="Inconsolata"/>
+                <a:sym typeface="Inconsolata"/>
+              </a:defRPr>
+            </a:lvl1pPr>
+            <a:lvl2pPr marR="0" lvl="1" algn="ctr" rtl="0">
+              <a:lnSpc>
+                <a:spcPct val="100000"/>
+              </a:lnSpc>
+              <a:spcBef>
+                <a:spcPts val="0"/>
+              </a:spcBef>
+              <a:spcAft>
+                <a:spcPts val="0"/>
+              </a:spcAft>
+              <a:buClr>
+                <a:schemeClr val="dk1"/>
+              </a:buClr>
+              <a:buSzPts val="3600"/>
+              <a:buFont typeface="Inconsolata"/>
+              <a:buNone/>
+              <a:defRPr sz="3600" b="1" i="0" u="none" strike="noStrike" cap="none">
+                <a:solidFill>
+                  <a:schemeClr val="dk1"/>
+                </a:solidFill>
+                <a:latin typeface="Inconsolata"/>
+                <a:ea typeface="Inconsolata"/>
+                <a:cs typeface="Inconsolata"/>
+                <a:sym typeface="Inconsolata"/>
+              </a:defRPr>
+            </a:lvl2pPr>
+            <a:lvl3pPr marR="0" lvl="2" algn="ctr" rtl="0">
+              <a:lnSpc>
+                <a:spcPct val="100000"/>
+              </a:lnSpc>
+              <a:spcBef>
+                <a:spcPts val="0"/>
+              </a:spcBef>
+              <a:spcAft>
+                <a:spcPts val="0"/>
+              </a:spcAft>
+              <a:buClr>
+                <a:schemeClr val="dk1"/>
+              </a:buClr>
+              <a:buSzPts val="3600"/>
+              <a:buFont typeface="Inconsolata"/>
+              <a:buNone/>
+              <a:defRPr sz="3600" b="1" i="0" u="none" strike="noStrike" cap="none">
+                <a:solidFill>
+                  <a:schemeClr val="dk1"/>
+                </a:solidFill>
+                <a:latin typeface="Inconsolata"/>
+                <a:ea typeface="Inconsolata"/>
+                <a:cs typeface="Inconsolata"/>
+                <a:sym typeface="Inconsolata"/>
+              </a:defRPr>
+            </a:lvl3pPr>
+            <a:lvl4pPr marR="0" lvl="3" algn="ctr" rtl="0">
+              <a:lnSpc>
+                <a:spcPct val="100000"/>
+              </a:lnSpc>
+              <a:spcBef>
+                <a:spcPts val="0"/>
+              </a:spcBef>
+              <a:spcAft>
+                <a:spcPts val="0"/>
+              </a:spcAft>
+              <a:buClr>
+                <a:schemeClr val="dk1"/>
+              </a:buClr>
+              <a:buSzPts val="3600"/>
+              <a:buFont typeface="Inconsolata"/>
+              <a:buNone/>
+              <a:defRPr sz="3600" b="1" i="0" u="none" strike="noStrike" cap="none">
+                <a:solidFill>
+                  <a:schemeClr val="dk1"/>
+                </a:solidFill>
+                <a:latin typeface="Inconsolata"/>
+                <a:ea typeface="Inconsolata"/>
+                <a:cs typeface="Inconsolata"/>
+                <a:sym typeface="Inconsolata"/>
+              </a:defRPr>
+            </a:lvl4pPr>
+            <a:lvl5pPr marR="0" lvl="4" algn="ctr" rtl="0">
+              <a:lnSpc>
+                <a:spcPct val="100000"/>
+              </a:lnSpc>
+              <a:spcBef>
+                <a:spcPts val="0"/>
+              </a:spcBef>
+              <a:spcAft>
+                <a:spcPts val="0"/>
+              </a:spcAft>
+              <a:buClr>
+                <a:schemeClr val="dk1"/>
+              </a:buClr>
+              <a:buSzPts val="3600"/>
+              <a:buFont typeface="Inconsolata"/>
+              <a:buNone/>
+              <a:defRPr sz="3600" b="1" i="0" u="none" strike="noStrike" cap="none">
+                <a:solidFill>
+                  <a:schemeClr val="dk1"/>
+                </a:solidFill>
+                <a:latin typeface="Inconsolata"/>
+                <a:ea typeface="Inconsolata"/>
+                <a:cs typeface="Inconsolata"/>
+                <a:sym typeface="Inconsolata"/>
+              </a:defRPr>
+            </a:lvl5pPr>
+            <a:lvl6pPr marR="0" lvl="5" algn="ctr" rtl="0">
+              <a:lnSpc>
+                <a:spcPct val="100000"/>
+              </a:lnSpc>
+              <a:spcBef>
+                <a:spcPts val="0"/>
+              </a:spcBef>
+              <a:spcAft>
+                <a:spcPts val="0"/>
+              </a:spcAft>
+              <a:buClr>
+                <a:schemeClr val="dk1"/>
+              </a:buClr>
+              <a:buSzPts val="3600"/>
+              <a:buFont typeface="Inconsolata"/>
+              <a:buNone/>
+              <a:defRPr sz="3600" b="1" i="0" u="none" strike="noStrike" cap="none">
+                <a:solidFill>
+                  <a:schemeClr val="dk1"/>
+                </a:solidFill>
+                <a:latin typeface="Inconsolata"/>
+                <a:ea typeface="Inconsolata"/>
+                <a:cs typeface="Inconsolata"/>
+                <a:sym typeface="Inconsolata"/>
+              </a:defRPr>
+            </a:lvl6pPr>
+            <a:lvl7pPr marR="0" lvl="6" algn="ctr" rtl="0">
+              <a:lnSpc>
+                <a:spcPct val="100000"/>
+              </a:lnSpc>
+              <a:spcBef>
+                <a:spcPts val="0"/>
+              </a:spcBef>
+              <a:spcAft>
+                <a:spcPts val="0"/>
+              </a:spcAft>
+              <a:buClr>
+                <a:schemeClr val="dk1"/>
+              </a:buClr>
+              <a:buSzPts val="3600"/>
+              <a:buFont typeface="Inconsolata"/>
+              <a:buNone/>
+              <a:defRPr sz="3600" b="1" i="0" u="none" strike="noStrike" cap="none">
+                <a:solidFill>
+                  <a:schemeClr val="dk1"/>
+                </a:solidFill>
+                <a:latin typeface="Inconsolata"/>
+                <a:ea typeface="Inconsolata"/>
+                <a:cs typeface="Inconsolata"/>
+                <a:sym typeface="Inconsolata"/>
+              </a:defRPr>
+            </a:lvl7pPr>
+            <a:lvl8pPr marR="0" lvl="7" algn="ctr" rtl="0">
+              <a:lnSpc>
+                <a:spcPct val="100000"/>
+              </a:lnSpc>
+              <a:spcBef>
+                <a:spcPts val="0"/>
+              </a:spcBef>
+              <a:spcAft>
+                <a:spcPts val="0"/>
+              </a:spcAft>
+              <a:buClr>
+                <a:schemeClr val="dk1"/>
+              </a:buClr>
+              <a:buSzPts val="3600"/>
+              <a:buFont typeface="Inconsolata"/>
+              <a:buNone/>
+              <a:defRPr sz="3600" b="1" i="0" u="none" strike="noStrike" cap="none">
+                <a:solidFill>
+                  <a:schemeClr val="dk1"/>
+                </a:solidFill>
+                <a:latin typeface="Inconsolata"/>
+                <a:ea typeface="Inconsolata"/>
+                <a:cs typeface="Inconsolata"/>
+                <a:sym typeface="Inconsolata"/>
+              </a:defRPr>
+            </a:lvl8pPr>
+            <a:lvl9pPr marR="0" lvl="8" algn="ctr" rtl="0">
+              <a:lnSpc>
+                <a:spcPct val="100000"/>
+              </a:lnSpc>
+              <a:spcBef>
+                <a:spcPts val="0"/>
+              </a:spcBef>
+              <a:spcAft>
+                <a:spcPts val="0"/>
+              </a:spcAft>
+              <a:buClr>
+                <a:schemeClr val="dk1"/>
+              </a:buClr>
+              <a:buSzPts val="3600"/>
+              <a:buFont typeface="Inconsolata"/>
+              <a:buNone/>
+              <a:defRPr sz="3600" b="1" i="0" u="none" strike="noStrike" cap="none">
+                <a:solidFill>
+                  <a:schemeClr val="dk1"/>
+                </a:solidFill>
+                <a:latin typeface="Inconsolata"/>
+                <a:ea typeface="Inconsolata"/>
+                <a:cs typeface="Inconsolata"/>
+                <a:sym typeface="Inconsolata"/>
+              </a:defRPr>
+            </a:lvl9pPr>
+          </a:lstStyle>
+          <a:p>
+            <a:r>
+              <a:rPr lang="en-US" sz="3200" dirty="0">
+                <a:solidFill>
+                  <a:srgbClr val="C95EFF"/>
+                </a:solidFill>
+                <a:latin typeface="Spy Agency 3D" pitchFamily="2" charset="0"/>
+              </a:rPr>
+              <a:t>4. Exercises</a:t>
+            </a:r>
+          </a:p>
+        </p:txBody>
+      </p:sp>
+      <p:pic>
+        <p:nvPicPr>
+          <p:cNvPr id="8" name="Picture 7">
+            <a:extLst>
+              <a:ext uri="{FF2B5EF4-FFF2-40B4-BE49-F238E27FC236}">
+                <a16:creationId xmlns:a16="http://schemas.microsoft.com/office/drawing/2014/main" id="{208D6956-7D22-434A-A6B1-E780C9006563}"/>
+              </a:ext>
+            </a:extLst>
+          </p:cNvPr>
+          <p:cNvPicPr>
+            <a:picLocks noChangeAspect="1"/>
+          </p:cNvPicPr>
+          <p:nvPr/>
+        </p:nvPicPr>
+        <p:blipFill>
+          <a:blip r:embed="rId2"/>
+          <a:stretch>
+            <a:fillRect/>
+          </a:stretch>
+        </p:blipFill>
+        <p:spPr>
+          <a:xfrm>
+            <a:off x="4572000" y="2302508"/>
+            <a:ext cx="3051402" cy="538483"/>
+          </a:xfrm>
+          <a:prstGeom prst="rect">
+            <a:avLst/>
+          </a:prstGeom>
+        </p:spPr>
+      </p:pic>
+      <p:sp>
+        <p:nvSpPr>
+          <p:cNvPr id="13" name="Footer Placeholder 3">
+            <a:extLst>
+              <a:ext uri="{FF2B5EF4-FFF2-40B4-BE49-F238E27FC236}">
+                <a16:creationId xmlns:a16="http://schemas.microsoft.com/office/drawing/2014/main" id="{CB436D9F-C7C4-49FA-B926-9EA69C93145D}"/>
+              </a:ext>
+            </a:extLst>
+          </p:cNvPr>
+          <p:cNvSpPr>
+            <a:spLocks noGrp="1"/>
+          </p:cNvSpPr>
+          <p:nvPr>
+            <p:ph type="ftr" sz="quarter" idx="10"/>
+          </p:nvPr>
+        </p:nvSpPr>
+        <p:spPr>
+          <a:xfrm>
+            <a:off x="4572000" y="1242350"/>
+            <a:ext cx="2867891" cy="423914"/>
+          </a:xfrm>
+        </p:spPr>
+        <p:txBody>
+          <a:bodyPr/>
+          <a:lstStyle/>
+          <a:p>
+            <a:r>
+              <a:rPr lang="en-US" sz="2400" b="1" dirty="0">
+                <a:solidFill>
+                  <a:srgbClr val="FF0000"/>
+                </a:solidFill>
+              </a:rPr>
+              <a:t>Reverse a Number</a:t>
+            </a:r>
+          </a:p>
+        </p:txBody>
+      </p:sp>
+      <p:pic>
+        <p:nvPicPr>
+          <p:cNvPr id="5" name="Picture 4">
+            <a:extLst>
+              <a:ext uri="{FF2B5EF4-FFF2-40B4-BE49-F238E27FC236}">
+                <a16:creationId xmlns:a16="http://schemas.microsoft.com/office/drawing/2014/main" id="{20CD3283-5BA9-4214-A9FB-6F19AE160565}"/>
+              </a:ext>
+            </a:extLst>
+          </p:cNvPr>
+          <p:cNvPicPr>
+            <a:picLocks noChangeAspect="1"/>
+          </p:cNvPicPr>
+          <p:nvPr/>
+        </p:nvPicPr>
+        <p:blipFill>
+          <a:blip r:embed="rId3"/>
+          <a:stretch>
+            <a:fillRect/>
+          </a:stretch>
+        </p:blipFill>
+        <p:spPr>
+          <a:xfrm>
+            <a:off x="1241772" y="694391"/>
+            <a:ext cx="2935374" cy="4245208"/>
+          </a:xfrm>
+          <a:prstGeom prst="rect">
+            <a:avLst/>
+          </a:prstGeom>
+        </p:spPr>
+      </p:pic>
+    </p:spTree>
+    <p:extLst>
+      <p:ext uri="{BB962C8B-B14F-4D97-AF65-F5344CB8AC3E}">
+        <p14:creationId xmlns:p14="http://schemas.microsoft.com/office/powerpoint/2010/main" val="3308159713"/>
+      </p:ext>
+    </p:extLst>
+  </p:cSld>
+  <p:clrMapOvr>
+    <a:masterClrMapping/>
+  </p:clrMapOvr>
+</p:sld>
+</file>
+
+<file path=ppt/slides/slide27.xml><?xml version="1.0" encoding="utf-8"?>
+<p:sld xmlns:a="http://schemas.openxmlformats.org/drawingml/2006/main" xmlns:r="http://schemas.openxmlformats.org/officeDocument/2006/relationships" xmlns:p="http://schemas.openxmlformats.org/presentationml/2006/main">
+  <p:cSld>
+    <p:spTree>
+      <p:nvGrpSpPr>
+        <p:cNvPr id="1" name=""/>
+        <p:cNvGrpSpPr/>
+        <p:nvPr/>
+      </p:nvGrpSpPr>
+      <p:grpSpPr>
+        <a:xfrm>
+          <a:off x="0" y="0"/>
+          <a:ext cx="0" cy="0"/>
+          <a:chOff x="0" y="0"/>
+          <a:chExt cx="0" cy="0"/>
+        </a:xfrm>
+      </p:grpSpPr>
+      <p:sp>
+        <p:nvSpPr>
+          <p:cNvPr id="2" name="Slide Number Placeholder 1">
+            <a:extLst>
+              <a:ext uri="{FF2B5EF4-FFF2-40B4-BE49-F238E27FC236}">
+                <a16:creationId xmlns:a16="http://schemas.microsoft.com/office/drawing/2014/main" id="{F0E9E79F-BAA5-4481-B2DE-5A5D2AAAB517}"/>
+              </a:ext>
+            </a:extLst>
+          </p:cNvPr>
+          <p:cNvSpPr>
+            <a:spLocks noGrp="1"/>
+          </p:cNvSpPr>
+          <p:nvPr>
+            <p:ph type="sldNum" sz="quarter" idx="11"/>
+          </p:nvPr>
+        </p:nvSpPr>
+        <p:spPr/>
+        <p:txBody>
+          <a:bodyPr/>
+          <a:lstStyle/>
+          <a:p>
+            <a:fld id="{54586125-9BB9-47C9-A1C0-5B3BEBE258A1}" type="slidenum">
+              <a:rPr lang="en-US" smtClean="0"/>
+              <a:t>27</a:t>
+            </a:fld>
+            <a:endParaRPr lang="en-US"/>
+          </a:p>
+        </p:txBody>
+      </p:sp>
+      <p:cxnSp>
+        <p:nvCxnSpPr>
+          <p:cNvPr id="3" name="Google Shape;413;p66">
+            <a:extLst>
+              <a:ext uri="{FF2B5EF4-FFF2-40B4-BE49-F238E27FC236}">
+                <a16:creationId xmlns:a16="http://schemas.microsoft.com/office/drawing/2014/main" id="{888B6229-90BF-496A-9A39-6C2BF18692D6}"/>
+              </a:ext>
+            </a:extLst>
+          </p:cNvPr>
+          <p:cNvCxnSpPr>
+            <a:cxnSpLocks/>
+          </p:cNvCxnSpPr>
+          <p:nvPr/>
+        </p:nvCxnSpPr>
+        <p:spPr>
+          <a:xfrm>
+            <a:off x="7277493" y="430025"/>
+            <a:ext cx="1884582" cy="0"/>
+          </a:xfrm>
+          <a:prstGeom prst="straightConnector1">
+            <a:avLst/>
+          </a:prstGeom>
+          <a:noFill/>
+          <a:ln w="9525" cap="flat" cmpd="sng">
+            <a:solidFill>
+              <a:schemeClr val="accent2"/>
+            </a:solidFill>
+            <a:prstDash val="solid"/>
+            <a:round/>
+            <a:headEnd type="none" w="med" len="med"/>
+            <a:tailEnd type="none" w="med" len="med"/>
+          </a:ln>
+        </p:spPr>
+      </p:cxnSp>
+      <p:sp>
+        <p:nvSpPr>
+          <p:cNvPr id="12" name="Title 1">
+            <a:extLst>
+              <a:ext uri="{FF2B5EF4-FFF2-40B4-BE49-F238E27FC236}">
+                <a16:creationId xmlns:a16="http://schemas.microsoft.com/office/drawing/2014/main" id="{669B6B9A-114E-4164-9D9C-67C30657CC88}"/>
+              </a:ext>
+            </a:extLst>
+          </p:cNvPr>
+          <p:cNvSpPr txBox="1">
+            <a:spLocks/>
+          </p:cNvSpPr>
+          <p:nvPr/>
+        </p:nvSpPr>
+        <p:spPr>
+          <a:xfrm>
+            <a:off x="3482340" y="155904"/>
+            <a:ext cx="3571604" cy="538486"/>
+          </a:xfrm>
+          <a:prstGeom prst="rect">
+            <a:avLst/>
+          </a:prstGeom>
+          <a:noFill/>
+          <a:ln>
+            <a:noFill/>
+          </a:ln>
+        </p:spPr>
+        <p:txBody>
+          <a:bodyPr spcFirstLastPara="1" wrap="square" lIns="91425" tIns="91425" rIns="91425" bIns="91425" anchor="t" anchorCtr="0">
+            <a:normAutofit fontScale="92500" lnSpcReduction="10000"/>
+          </a:bodyPr>
+          <a:lstStyle>
+            <a:defPPr marR="0" lvl="0" algn="l" rtl="0">
+              <a:lnSpc>
+                <a:spcPct val="100000"/>
+              </a:lnSpc>
+              <a:spcBef>
+                <a:spcPts val="0"/>
+              </a:spcBef>
+              <a:spcAft>
+                <a:spcPts val="0"/>
+              </a:spcAft>
+            </a:defPPr>
+            <a:lvl1pPr marR="0" lvl="0" algn="l" rtl="0">
+              <a:lnSpc>
+                <a:spcPct val="80000"/>
+              </a:lnSpc>
+              <a:spcBef>
+                <a:spcPts val="0"/>
+              </a:spcBef>
+              <a:spcAft>
+                <a:spcPts val="0"/>
+              </a:spcAft>
+              <a:buClr>
+                <a:schemeClr val="dk1"/>
+              </a:buClr>
+              <a:buSzPts val="3600"/>
+              <a:buFont typeface="Inconsolata"/>
+              <a:buNone/>
+              <a:defRPr sz="4000" b="1" i="0" u="none" strike="noStrike" cap="none">
+                <a:solidFill>
+                  <a:schemeClr val="dk1"/>
+                </a:solidFill>
+                <a:latin typeface="Inconsolata"/>
+                <a:ea typeface="Inconsolata"/>
+                <a:cs typeface="Inconsolata"/>
+                <a:sym typeface="Inconsolata"/>
+              </a:defRPr>
+            </a:lvl1pPr>
+            <a:lvl2pPr marR="0" lvl="1" algn="ctr" rtl="0">
+              <a:lnSpc>
+                <a:spcPct val="100000"/>
+              </a:lnSpc>
+              <a:spcBef>
+                <a:spcPts val="0"/>
+              </a:spcBef>
+              <a:spcAft>
+                <a:spcPts val="0"/>
+              </a:spcAft>
+              <a:buClr>
+                <a:schemeClr val="dk1"/>
+              </a:buClr>
+              <a:buSzPts val="3600"/>
+              <a:buFont typeface="Inconsolata"/>
+              <a:buNone/>
+              <a:defRPr sz="3600" b="1" i="0" u="none" strike="noStrike" cap="none">
+                <a:solidFill>
+                  <a:schemeClr val="dk1"/>
+                </a:solidFill>
+                <a:latin typeface="Inconsolata"/>
+                <a:ea typeface="Inconsolata"/>
+                <a:cs typeface="Inconsolata"/>
+                <a:sym typeface="Inconsolata"/>
+              </a:defRPr>
+            </a:lvl2pPr>
+            <a:lvl3pPr marR="0" lvl="2" algn="ctr" rtl="0">
+              <a:lnSpc>
+                <a:spcPct val="100000"/>
+              </a:lnSpc>
+              <a:spcBef>
+                <a:spcPts val="0"/>
+              </a:spcBef>
+              <a:spcAft>
+                <a:spcPts val="0"/>
+              </a:spcAft>
+              <a:buClr>
+                <a:schemeClr val="dk1"/>
+              </a:buClr>
+              <a:buSzPts val="3600"/>
+              <a:buFont typeface="Inconsolata"/>
+              <a:buNone/>
+              <a:defRPr sz="3600" b="1" i="0" u="none" strike="noStrike" cap="none">
+                <a:solidFill>
+                  <a:schemeClr val="dk1"/>
+                </a:solidFill>
+                <a:latin typeface="Inconsolata"/>
+                <a:ea typeface="Inconsolata"/>
+                <a:cs typeface="Inconsolata"/>
+                <a:sym typeface="Inconsolata"/>
+              </a:defRPr>
+            </a:lvl3pPr>
+            <a:lvl4pPr marR="0" lvl="3" algn="ctr" rtl="0">
+              <a:lnSpc>
+                <a:spcPct val="100000"/>
+              </a:lnSpc>
+              <a:spcBef>
+                <a:spcPts val="0"/>
+              </a:spcBef>
+              <a:spcAft>
+                <a:spcPts val="0"/>
+              </a:spcAft>
+              <a:buClr>
+                <a:schemeClr val="dk1"/>
+              </a:buClr>
+              <a:buSzPts val="3600"/>
+              <a:buFont typeface="Inconsolata"/>
+              <a:buNone/>
+              <a:defRPr sz="3600" b="1" i="0" u="none" strike="noStrike" cap="none">
+                <a:solidFill>
+                  <a:schemeClr val="dk1"/>
+                </a:solidFill>
+                <a:latin typeface="Inconsolata"/>
+                <a:ea typeface="Inconsolata"/>
+                <a:cs typeface="Inconsolata"/>
+                <a:sym typeface="Inconsolata"/>
+              </a:defRPr>
+            </a:lvl4pPr>
+            <a:lvl5pPr marR="0" lvl="4" algn="ctr" rtl="0">
+              <a:lnSpc>
+                <a:spcPct val="100000"/>
+              </a:lnSpc>
+              <a:spcBef>
+                <a:spcPts val="0"/>
+              </a:spcBef>
+              <a:spcAft>
+                <a:spcPts val="0"/>
+              </a:spcAft>
+              <a:buClr>
+                <a:schemeClr val="dk1"/>
+              </a:buClr>
+              <a:buSzPts val="3600"/>
+              <a:buFont typeface="Inconsolata"/>
+              <a:buNone/>
+              <a:defRPr sz="3600" b="1" i="0" u="none" strike="noStrike" cap="none">
+                <a:solidFill>
+                  <a:schemeClr val="dk1"/>
+                </a:solidFill>
+                <a:latin typeface="Inconsolata"/>
+                <a:ea typeface="Inconsolata"/>
+                <a:cs typeface="Inconsolata"/>
+                <a:sym typeface="Inconsolata"/>
+              </a:defRPr>
+            </a:lvl5pPr>
+            <a:lvl6pPr marR="0" lvl="5" algn="ctr" rtl="0">
+              <a:lnSpc>
+                <a:spcPct val="100000"/>
+              </a:lnSpc>
+              <a:spcBef>
+                <a:spcPts val="0"/>
+              </a:spcBef>
+              <a:spcAft>
+                <a:spcPts val="0"/>
+              </a:spcAft>
+              <a:buClr>
+                <a:schemeClr val="dk1"/>
+              </a:buClr>
+              <a:buSzPts val="3600"/>
+              <a:buFont typeface="Inconsolata"/>
+              <a:buNone/>
+              <a:defRPr sz="3600" b="1" i="0" u="none" strike="noStrike" cap="none">
+                <a:solidFill>
+                  <a:schemeClr val="dk1"/>
+                </a:solidFill>
+                <a:latin typeface="Inconsolata"/>
+                <a:ea typeface="Inconsolata"/>
+                <a:cs typeface="Inconsolata"/>
+                <a:sym typeface="Inconsolata"/>
+              </a:defRPr>
+            </a:lvl6pPr>
+            <a:lvl7pPr marR="0" lvl="6" algn="ctr" rtl="0">
+              <a:lnSpc>
+                <a:spcPct val="100000"/>
+              </a:lnSpc>
+              <a:spcBef>
+                <a:spcPts val="0"/>
+              </a:spcBef>
+              <a:spcAft>
+                <a:spcPts val="0"/>
+              </a:spcAft>
+              <a:buClr>
+                <a:schemeClr val="dk1"/>
+              </a:buClr>
+              <a:buSzPts val="3600"/>
+              <a:buFont typeface="Inconsolata"/>
+              <a:buNone/>
+              <a:defRPr sz="3600" b="1" i="0" u="none" strike="noStrike" cap="none">
+                <a:solidFill>
+                  <a:schemeClr val="dk1"/>
+                </a:solidFill>
+                <a:latin typeface="Inconsolata"/>
+                <a:ea typeface="Inconsolata"/>
+                <a:cs typeface="Inconsolata"/>
+                <a:sym typeface="Inconsolata"/>
+              </a:defRPr>
+            </a:lvl7pPr>
+            <a:lvl8pPr marR="0" lvl="7" algn="ctr" rtl="0">
+              <a:lnSpc>
+                <a:spcPct val="100000"/>
+              </a:lnSpc>
+              <a:spcBef>
+                <a:spcPts val="0"/>
+              </a:spcBef>
+              <a:spcAft>
+                <a:spcPts val="0"/>
+              </a:spcAft>
+              <a:buClr>
+                <a:schemeClr val="dk1"/>
+              </a:buClr>
+              <a:buSzPts val="3600"/>
+              <a:buFont typeface="Inconsolata"/>
+              <a:buNone/>
+              <a:defRPr sz="3600" b="1" i="0" u="none" strike="noStrike" cap="none">
+                <a:solidFill>
+                  <a:schemeClr val="dk1"/>
+                </a:solidFill>
+                <a:latin typeface="Inconsolata"/>
+                <a:ea typeface="Inconsolata"/>
+                <a:cs typeface="Inconsolata"/>
+                <a:sym typeface="Inconsolata"/>
+              </a:defRPr>
+            </a:lvl8pPr>
+            <a:lvl9pPr marR="0" lvl="8" algn="ctr" rtl="0">
+              <a:lnSpc>
+                <a:spcPct val="100000"/>
+              </a:lnSpc>
+              <a:spcBef>
+                <a:spcPts val="0"/>
+              </a:spcBef>
+              <a:spcAft>
+                <a:spcPts val="0"/>
+              </a:spcAft>
+              <a:buClr>
+                <a:schemeClr val="dk1"/>
+              </a:buClr>
+              <a:buSzPts val="3600"/>
+              <a:buFont typeface="Inconsolata"/>
+              <a:buNone/>
+              <a:defRPr sz="3600" b="1" i="0" u="none" strike="noStrike" cap="none">
+                <a:solidFill>
+                  <a:schemeClr val="dk1"/>
+                </a:solidFill>
+                <a:latin typeface="Inconsolata"/>
+                <a:ea typeface="Inconsolata"/>
+                <a:cs typeface="Inconsolata"/>
+                <a:sym typeface="Inconsolata"/>
+              </a:defRPr>
+            </a:lvl9pPr>
+          </a:lstStyle>
+          <a:p>
+            <a:r>
+              <a:rPr lang="en-US" sz="3200" dirty="0">
+                <a:solidFill>
+                  <a:srgbClr val="C95EFF"/>
+                </a:solidFill>
+                <a:latin typeface="Spy Agency 3D" pitchFamily="2" charset="0"/>
+              </a:rPr>
+              <a:t>4. Exercises</a:t>
+            </a:r>
+          </a:p>
+        </p:txBody>
+      </p:sp>
+      <p:pic>
+        <p:nvPicPr>
+          <p:cNvPr id="8" name="Picture 7">
+            <a:extLst>
+              <a:ext uri="{FF2B5EF4-FFF2-40B4-BE49-F238E27FC236}">
+                <a16:creationId xmlns:a16="http://schemas.microsoft.com/office/drawing/2014/main" id="{208D6956-7D22-434A-A6B1-E780C9006563}"/>
+              </a:ext>
+            </a:extLst>
+          </p:cNvPr>
+          <p:cNvPicPr>
+            <a:picLocks noChangeAspect="1"/>
+          </p:cNvPicPr>
+          <p:nvPr/>
+        </p:nvPicPr>
+        <p:blipFill>
+          <a:blip r:embed="rId2"/>
+          <a:stretch>
+            <a:fillRect/>
+          </a:stretch>
+        </p:blipFill>
+        <p:spPr>
+          <a:xfrm>
+            <a:off x="4572000" y="2302508"/>
+            <a:ext cx="3051402" cy="538483"/>
+          </a:xfrm>
+          <a:prstGeom prst="rect">
+            <a:avLst/>
+          </a:prstGeom>
+        </p:spPr>
+      </p:pic>
+      <p:sp>
+        <p:nvSpPr>
+          <p:cNvPr id="13" name="Footer Placeholder 3">
+            <a:extLst>
+              <a:ext uri="{FF2B5EF4-FFF2-40B4-BE49-F238E27FC236}">
+                <a16:creationId xmlns:a16="http://schemas.microsoft.com/office/drawing/2014/main" id="{CB436D9F-C7C4-49FA-B926-9EA69C93145D}"/>
+              </a:ext>
+            </a:extLst>
+          </p:cNvPr>
+          <p:cNvSpPr>
+            <a:spLocks noGrp="1"/>
+          </p:cNvSpPr>
+          <p:nvPr>
+            <p:ph type="ftr" sz="quarter" idx="10"/>
+          </p:nvPr>
+        </p:nvSpPr>
+        <p:spPr>
+          <a:xfrm>
+            <a:off x="4572000" y="1242350"/>
+            <a:ext cx="2867891" cy="423914"/>
+          </a:xfrm>
+        </p:spPr>
+        <p:txBody>
+          <a:bodyPr/>
+          <a:lstStyle/>
+          <a:p>
+            <a:r>
+              <a:rPr lang="en-US" sz="2400" b="1" dirty="0">
+                <a:solidFill>
+                  <a:srgbClr val="FF0000"/>
+                </a:solidFill>
+              </a:rPr>
+              <a:t>Reverse a Number</a:t>
+            </a:r>
+          </a:p>
+        </p:txBody>
+      </p:sp>
+      <p:pic>
+        <p:nvPicPr>
+          <p:cNvPr id="5" name="Picture 4">
+            <a:extLst>
+              <a:ext uri="{FF2B5EF4-FFF2-40B4-BE49-F238E27FC236}">
+                <a16:creationId xmlns:a16="http://schemas.microsoft.com/office/drawing/2014/main" id="{79E84CE4-C6DE-4089-85BD-71413C179C3D}"/>
+              </a:ext>
+            </a:extLst>
+          </p:cNvPr>
+          <p:cNvPicPr>
+            <a:picLocks noChangeAspect="1"/>
+          </p:cNvPicPr>
+          <p:nvPr/>
+        </p:nvPicPr>
+        <p:blipFill>
+          <a:blip r:embed="rId3"/>
+          <a:stretch>
+            <a:fillRect/>
+          </a:stretch>
+        </p:blipFill>
+        <p:spPr>
+          <a:xfrm>
+            <a:off x="309124" y="694390"/>
+            <a:ext cx="4092295" cy="4221846"/>
+          </a:xfrm>
+          <a:prstGeom prst="rect">
+            <a:avLst/>
+          </a:prstGeom>
+        </p:spPr>
+      </p:pic>
+    </p:spTree>
+    <p:extLst>
+      <p:ext uri="{BB962C8B-B14F-4D97-AF65-F5344CB8AC3E}">
+        <p14:creationId xmlns:p14="http://schemas.microsoft.com/office/powerpoint/2010/main" val="1288325156"/>
       </p:ext>
     </p:extLst>
   </p:cSld>

</xml_diff>